<commit_message>
update readme + adjusted game size
</commit_message>
<xml_diff>
--- a/Trap_The_Cat_MachineLearning.pptx
+++ b/Trap_The_Cat_MachineLearning.pptx
@@ -6,6 +6,9 @@
   </p:sldMasterIdLst>
   <p:sldIdLst>
     <p:sldId id="256" r:id="rId5"/>
+    <p:sldId id="257" r:id="rId6"/>
+    <p:sldId id="258" r:id="rId7"/>
+    <p:sldId id="259" r:id="rId8"/>
   </p:sldIdLst>
   <p:sldSz cx="12192000" cy="6858000"/>
   <p:notesSz cx="6858000" cy="9144000"/>
@@ -112,6 +115,718 @@
 </p:presentation>
 </file>
 
+<file path=ppt/revisionInfo.xml><?xml version="1.0" encoding="utf-8"?>
+<p1510:revInfo xmlns:a="http://schemas.openxmlformats.org/drawingml/2006/main" xmlns:r="http://schemas.openxmlformats.org/officeDocument/2006/relationships" xmlns:p1510="http://schemas.microsoft.com/office/powerpoint/2015/10/main">
+  <p1510:revLst>
+    <p1510:client id="{8CBD382F-D9FD-A13D-E155-36ECB55EBFFD}" v="29" dt="2025-03-24T14:34:06.458"/>
+    <p1510:client id="{F2DFAB1C-6746-3C58-BE55-59840E727156}" v="784" dt="2025-03-24T15:04:07.988"/>
+  </p1510:revLst>
+</p1510:revInfo>
+</file>
+
+<file path=ppt/changesInfos/changesInfo1.xml><?xml version="1.0" encoding="utf-8"?>
+<pc:chgInfo xmlns:a="http://schemas.openxmlformats.org/drawingml/2006/main" xmlns:r="http://schemas.openxmlformats.org/officeDocument/2006/relationships" xmlns:ac="http://schemas.microsoft.com/office/drawing/2013/main/command" xmlns:pc="http://schemas.microsoft.com/office/powerpoint/2013/main/command">
+  <pc:docChgLst>
+    <pc:chgData name="Sam De Wispelaere" userId="S::r0986076@student.vives.be::e9ee75a4-3b98-416e-a358-897d61f9ac81" providerId="AD" clId="Web-{8CBD382F-D9FD-A13D-E155-36ECB55EBFFD}"/>
+    <pc:docChg chg="modSld">
+      <pc:chgData name="Sam De Wispelaere" userId="S::r0986076@student.vives.be::e9ee75a4-3b98-416e-a358-897d61f9ac81" providerId="AD" clId="Web-{8CBD382F-D9FD-A13D-E155-36ECB55EBFFD}" dt="2025-03-24T14:34:02.942" v="20" actId="20577"/>
+      <pc:docMkLst>
+        <pc:docMk/>
+      </pc:docMkLst>
+      <pc:sldChg chg="addSp delSp modSp">
+        <pc:chgData name="Sam De Wispelaere" userId="S::r0986076@student.vives.be::e9ee75a4-3b98-416e-a358-897d61f9ac81" providerId="AD" clId="Web-{8CBD382F-D9FD-A13D-E155-36ECB55EBFFD}" dt="2025-03-24T14:34:02.942" v="20" actId="20577"/>
+        <pc:sldMkLst>
+          <pc:docMk/>
+          <pc:sldMk cId="1383005855" sldId="256"/>
+        </pc:sldMkLst>
+        <pc:spChg chg="del mod">
+          <ac:chgData name="Sam De Wispelaere" userId="S::r0986076@student.vives.be::e9ee75a4-3b98-416e-a358-897d61f9ac81" providerId="AD" clId="Web-{8CBD382F-D9FD-A13D-E155-36ECB55EBFFD}" dt="2025-03-24T14:33:42.800" v="9"/>
+          <ac:spMkLst>
+            <pc:docMk/>
+            <pc:sldMk cId="1383005855" sldId="256"/>
+            <ac:spMk id="2" creationId="{CCB66148-232A-4279-84DE-CF69E63D92C8}"/>
+          </ac:spMkLst>
+        </pc:spChg>
+        <pc:spChg chg="del">
+          <ac:chgData name="Sam De Wispelaere" userId="S::r0986076@student.vives.be::e9ee75a4-3b98-416e-a358-897d61f9ac81" providerId="AD" clId="Web-{8CBD382F-D9FD-A13D-E155-36ECB55EBFFD}" dt="2025-03-24T14:33:44.285" v="10"/>
+          <ac:spMkLst>
+            <pc:docMk/>
+            <pc:sldMk cId="1383005855" sldId="256"/>
+            <ac:spMk id="3" creationId="{504B3B01-EFA9-44B8-A7D0-F7C7F6D43E9E}"/>
+          </ac:spMkLst>
+        </pc:spChg>
+        <pc:spChg chg="add del mod">
+          <ac:chgData name="Sam De Wispelaere" userId="S::r0986076@student.vives.be::e9ee75a4-3b98-416e-a358-897d61f9ac81" providerId="AD" clId="Web-{8CBD382F-D9FD-A13D-E155-36ECB55EBFFD}" dt="2025-03-24T14:33:45.582" v="11"/>
+          <ac:spMkLst>
+            <pc:docMk/>
+            <pc:sldMk cId="1383005855" sldId="256"/>
+            <ac:spMk id="5" creationId="{8BC5366C-EFC9-A4F4-75E5-DA83F348BAE0}"/>
+          </ac:spMkLst>
+        </pc:spChg>
+        <pc:spChg chg="add mod">
+          <ac:chgData name="Sam De Wispelaere" userId="S::r0986076@student.vives.be::e9ee75a4-3b98-416e-a358-897d61f9ac81" providerId="AD" clId="Web-{8CBD382F-D9FD-A13D-E155-36ECB55EBFFD}" dt="2025-03-24T14:34:02.942" v="20" actId="20577"/>
+          <ac:spMkLst>
+            <pc:docMk/>
+            <pc:sldMk cId="1383005855" sldId="256"/>
+            <ac:spMk id="6" creationId="{FC3E0FB7-59DA-56C6-51AD-4CA40AB4462E}"/>
+          </ac:spMkLst>
+        </pc:spChg>
+      </pc:sldChg>
+    </pc:docChg>
+  </pc:docChgLst>
+  <pc:docChgLst>
+    <pc:chgData name="Sam De Wispelaere" userId="S::r0986076@student.vives.be::e9ee75a4-3b98-416e-a358-897d61f9ac81" providerId="AD" clId="Web-{F2DFAB1C-6746-3C58-BE55-59840E727156}"/>
+    <pc:docChg chg="addSld modSld addMainMaster delMainMaster">
+      <pc:chgData name="Sam De Wispelaere" userId="S::r0986076@student.vives.be::e9ee75a4-3b98-416e-a358-897d61f9ac81" providerId="AD" clId="Web-{F2DFAB1C-6746-3C58-BE55-59840E727156}" dt="2025-03-24T15:04:07.551" v="461" actId="20577"/>
+      <pc:docMkLst>
+        <pc:docMk/>
+      </pc:docMkLst>
+      <pc:sldChg chg="addSp delSp modSp mod setBg modClrScheme chgLayout">
+        <pc:chgData name="Sam De Wispelaere" userId="S::r0986076@student.vives.be::e9ee75a4-3b98-416e-a358-897d61f9ac81" providerId="AD" clId="Web-{F2DFAB1C-6746-3C58-BE55-59840E727156}" dt="2025-03-24T15:00:31.262" v="406" actId="1076"/>
+        <pc:sldMkLst>
+          <pc:docMk/>
+          <pc:sldMk cId="1383005855" sldId="256"/>
+        </pc:sldMkLst>
+        <pc:spChg chg="add mod">
+          <ac:chgData name="Sam De Wispelaere" userId="S::r0986076@student.vives.be::e9ee75a4-3b98-416e-a358-897d61f9ac81" providerId="AD" clId="Web-{F2DFAB1C-6746-3C58-BE55-59840E727156}" dt="2025-03-24T14:46:14.138" v="259" actId="20577"/>
+          <ac:spMkLst>
+            <pc:docMk/>
+            <pc:sldMk cId="1383005855" sldId="256"/>
+            <ac:spMk id="3" creationId="{207ECF3A-61ED-7AF4-F966-6C82D00D5879}"/>
+          </ac:spMkLst>
+        </pc:spChg>
+        <pc:spChg chg="mod ord">
+          <ac:chgData name="Sam De Wispelaere" userId="S::r0986076@student.vives.be::e9ee75a4-3b98-416e-a358-897d61f9ac81" providerId="AD" clId="Web-{F2DFAB1C-6746-3C58-BE55-59840E727156}" dt="2025-03-24T15:00:31.262" v="406" actId="1076"/>
+          <ac:spMkLst>
+            <pc:docMk/>
+            <pc:sldMk cId="1383005855" sldId="256"/>
+            <ac:spMk id="6" creationId="{FC3E0FB7-59DA-56C6-51AD-4CA40AB4462E}"/>
+          </ac:spMkLst>
+        </pc:spChg>
+        <pc:spChg chg="add del">
+          <ac:chgData name="Sam De Wispelaere" userId="S::r0986076@student.vives.be::e9ee75a4-3b98-416e-a358-897d61f9ac81" providerId="AD" clId="Web-{F2DFAB1C-6746-3C58-BE55-59840E727156}" dt="2025-03-24T14:36:54.478" v="35"/>
+          <ac:spMkLst>
+            <pc:docMk/>
+            <pc:sldMk cId="1383005855" sldId="256"/>
+            <ac:spMk id="11" creationId="{FAF3766F-DEF3-4802-BB0D-7A18EDD9704F}"/>
+          </ac:spMkLst>
+        </pc:spChg>
+        <pc:spChg chg="add del">
+          <ac:chgData name="Sam De Wispelaere" userId="S::r0986076@student.vives.be::e9ee75a4-3b98-416e-a358-897d61f9ac81" providerId="AD" clId="Web-{F2DFAB1C-6746-3C58-BE55-59840E727156}" dt="2025-03-24T14:36:54.478" v="35"/>
+          <ac:spMkLst>
+            <pc:docMk/>
+            <pc:sldMk cId="1383005855" sldId="256"/>
+            <ac:spMk id="13" creationId="{D91952F0-771E-D2ED-C333-EEED6708B80C}"/>
+          </ac:spMkLst>
+        </pc:spChg>
+        <pc:spChg chg="add del">
+          <ac:chgData name="Sam De Wispelaere" userId="S::r0986076@student.vives.be::e9ee75a4-3b98-416e-a358-897d61f9ac81" providerId="AD" clId="Web-{F2DFAB1C-6746-3C58-BE55-59840E727156}" dt="2025-03-24T14:36:54.478" v="35"/>
+          <ac:spMkLst>
+            <pc:docMk/>
+            <pc:sldMk cId="1383005855" sldId="256"/>
+            <ac:spMk id="15" creationId="{3FB6D83C-2377-9CAD-A991-9E0B6AF25067}"/>
+          </ac:spMkLst>
+        </pc:spChg>
+        <pc:spChg chg="add del">
+          <ac:chgData name="Sam De Wispelaere" userId="S::r0986076@student.vives.be::e9ee75a4-3b98-416e-a358-897d61f9ac81" providerId="AD" clId="Web-{F2DFAB1C-6746-3C58-BE55-59840E727156}" dt="2025-03-24T14:37:00.556" v="37"/>
+          <ac:spMkLst>
+            <pc:docMk/>
+            <pc:sldMk cId="1383005855" sldId="256"/>
+            <ac:spMk id="18" creationId="{70105F5E-5B61-4F51-927C-5B28DB7DD9BB}"/>
+          </ac:spMkLst>
+        </pc:spChg>
+        <pc:spChg chg="add del">
+          <ac:chgData name="Sam De Wispelaere" userId="S::r0986076@student.vives.be::e9ee75a4-3b98-416e-a358-897d61f9ac81" providerId="AD" clId="Web-{F2DFAB1C-6746-3C58-BE55-59840E727156}" dt="2025-03-24T14:37:00.556" v="37"/>
+          <ac:spMkLst>
+            <pc:docMk/>
+            <pc:sldMk cId="1383005855" sldId="256"/>
+            <ac:spMk id="19" creationId="{5882C1C4-D961-459C-91C5-334ABD6E63EA}"/>
+          </ac:spMkLst>
+        </pc:spChg>
+        <pc:spChg chg="add del">
+          <ac:chgData name="Sam De Wispelaere" userId="S::r0986076@student.vives.be::e9ee75a4-3b98-416e-a358-897d61f9ac81" providerId="AD" clId="Web-{F2DFAB1C-6746-3C58-BE55-59840E727156}" dt="2025-03-24T14:37:00.556" v="37"/>
+          <ac:spMkLst>
+            <pc:docMk/>
+            <pc:sldMk cId="1383005855" sldId="256"/>
+            <ac:spMk id="20" creationId="{A7B8B125-A98E-403C-9A7F-494FF789C26E}"/>
+          </ac:spMkLst>
+        </pc:spChg>
+        <pc:spChg chg="add del">
+          <ac:chgData name="Sam De Wispelaere" userId="S::r0986076@student.vives.be::e9ee75a4-3b98-416e-a358-897d61f9ac81" providerId="AD" clId="Web-{F2DFAB1C-6746-3C58-BE55-59840E727156}" dt="2025-03-24T14:37:05.838" v="39"/>
+          <ac:spMkLst>
+            <pc:docMk/>
+            <pc:sldMk cId="1383005855" sldId="256"/>
+            <ac:spMk id="22" creationId="{FAF3766F-DEF3-4802-BB0D-7A18EDD9704F}"/>
+          </ac:spMkLst>
+        </pc:spChg>
+        <pc:spChg chg="add del">
+          <ac:chgData name="Sam De Wispelaere" userId="S::r0986076@student.vives.be::e9ee75a4-3b98-416e-a358-897d61f9ac81" providerId="AD" clId="Web-{F2DFAB1C-6746-3C58-BE55-59840E727156}" dt="2025-03-24T14:37:05.838" v="39"/>
+          <ac:spMkLst>
+            <pc:docMk/>
+            <pc:sldMk cId="1383005855" sldId="256"/>
+            <ac:spMk id="23" creationId="{D91952F0-771E-D2ED-C333-EEED6708B80C}"/>
+          </ac:spMkLst>
+        </pc:spChg>
+        <pc:spChg chg="add del">
+          <ac:chgData name="Sam De Wispelaere" userId="S::r0986076@student.vives.be::e9ee75a4-3b98-416e-a358-897d61f9ac81" providerId="AD" clId="Web-{F2DFAB1C-6746-3C58-BE55-59840E727156}" dt="2025-03-24T14:37:05.838" v="39"/>
+          <ac:spMkLst>
+            <pc:docMk/>
+            <pc:sldMk cId="1383005855" sldId="256"/>
+            <ac:spMk id="24" creationId="{3FB6D83C-2377-9CAD-A991-9E0B6AF25067}"/>
+          </ac:spMkLst>
+        </pc:spChg>
+        <pc:picChg chg="add mod modCrop">
+          <ac:chgData name="Sam De Wispelaere" userId="S::r0986076@student.vives.be::e9ee75a4-3b98-416e-a358-897d61f9ac81" providerId="AD" clId="Web-{F2DFAB1C-6746-3C58-BE55-59840E727156}" dt="2025-03-24T14:37:05.838" v="39"/>
+          <ac:picMkLst>
+            <pc:docMk/>
+            <pc:sldMk cId="1383005855" sldId="256"/>
+            <ac:picMk id="2" creationId="{2A08E0DB-00DD-1E4B-E04F-DB99FFA20107}"/>
+          </ac:picMkLst>
+        </pc:picChg>
+        <pc:cxnChg chg="add del">
+          <ac:chgData name="Sam De Wispelaere" userId="S::r0986076@student.vives.be::e9ee75a4-3b98-416e-a358-897d61f9ac81" providerId="AD" clId="Web-{F2DFAB1C-6746-3C58-BE55-59840E727156}" dt="2025-03-24T14:37:00.556" v="37"/>
+          <ac:cxnSpMkLst>
+            <pc:docMk/>
+            <pc:sldMk cId="1383005855" sldId="256"/>
+            <ac:cxnSpMk id="17" creationId="{20B1C5DD-CB08-4407-9D12-CC2C42B047A7}"/>
+          </ac:cxnSpMkLst>
+        </pc:cxnChg>
+      </pc:sldChg>
+      <pc:sldChg chg="addSp delSp modSp new">
+        <pc:chgData name="Sam De Wispelaere" userId="S::r0986076@student.vives.be::e9ee75a4-3b98-416e-a358-897d61f9ac81" providerId="AD" clId="Web-{F2DFAB1C-6746-3C58-BE55-59840E727156}" dt="2025-03-24T14:47:21.203" v="283" actId="20577"/>
+        <pc:sldMkLst>
+          <pc:docMk/>
+          <pc:sldMk cId="2488136383" sldId="257"/>
+        </pc:sldMkLst>
+        <pc:spChg chg="del">
+          <ac:chgData name="Sam De Wispelaere" userId="S::r0986076@student.vives.be::e9ee75a4-3b98-416e-a358-897d61f9ac81" providerId="AD" clId="Web-{F2DFAB1C-6746-3C58-BE55-59840E727156}" dt="2025-03-24T14:37:15.744" v="41"/>
+          <ac:spMkLst>
+            <pc:docMk/>
+            <pc:sldMk cId="2488136383" sldId="257"/>
+            <ac:spMk id="2" creationId="{E7D1C2C9-C7C0-C59A-E43D-5EA64E4EB428}"/>
+          </ac:spMkLst>
+        </pc:spChg>
+        <pc:spChg chg="del">
+          <ac:chgData name="Sam De Wispelaere" userId="S::r0986076@student.vives.be::e9ee75a4-3b98-416e-a358-897d61f9ac81" providerId="AD" clId="Web-{F2DFAB1C-6746-3C58-BE55-59840E727156}" dt="2025-03-24T14:37:17.885" v="42"/>
+          <ac:spMkLst>
+            <pc:docMk/>
+            <pc:sldMk cId="2488136383" sldId="257"/>
+            <ac:spMk id="3" creationId="{17674E09-DEB1-83F8-ACF2-E05C667E8AE0}"/>
+          </ac:spMkLst>
+        </pc:spChg>
+        <pc:spChg chg="add mod">
+          <ac:chgData name="Sam De Wispelaere" userId="S::r0986076@student.vives.be::e9ee75a4-3b98-416e-a358-897d61f9ac81" providerId="AD" clId="Web-{F2DFAB1C-6746-3C58-BE55-59840E727156}" dt="2025-03-24T14:47:11.093" v="280" actId="20577"/>
+          <ac:spMkLst>
+            <pc:docMk/>
+            <pc:sldMk cId="2488136383" sldId="257"/>
+            <ac:spMk id="4" creationId="{A889BA1A-64DE-A483-2A92-833D7F6DD75E}"/>
+          </ac:spMkLst>
+        </pc:spChg>
+        <pc:spChg chg="add del mod">
+          <ac:chgData name="Sam De Wispelaere" userId="S::r0986076@student.vives.be::e9ee75a4-3b98-416e-a358-897d61f9ac81" providerId="AD" clId="Web-{F2DFAB1C-6746-3C58-BE55-59840E727156}" dt="2025-03-24T14:38:34.528" v="87"/>
+          <ac:spMkLst>
+            <pc:docMk/>
+            <pc:sldMk cId="2488136383" sldId="257"/>
+            <ac:spMk id="5" creationId="{E57654C7-626C-1C4D-1ACC-EFA68F8F3011}"/>
+          </ac:spMkLst>
+        </pc:spChg>
+        <pc:spChg chg="add mod">
+          <ac:chgData name="Sam De Wispelaere" userId="S::r0986076@student.vives.be::e9ee75a4-3b98-416e-a358-897d61f9ac81" providerId="AD" clId="Web-{F2DFAB1C-6746-3C58-BE55-59840E727156}" dt="2025-03-24T14:47:18.078" v="282" actId="20577"/>
+          <ac:spMkLst>
+            <pc:docMk/>
+            <pc:sldMk cId="2488136383" sldId="257"/>
+            <ac:spMk id="6" creationId="{901EDD76-B13E-F571-DD21-2771F2627802}"/>
+          </ac:spMkLst>
+        </pc:spChg>
+        <pc:spChg chg="add mod">
+          <ac:chgData name="Sam De Wispelaere" userId="S::r0986076@student.vives.be::e9ee75a4-3b98-416e-a358-897d61f9ac81" providerId="AD" clId="Web-{F2DFAB1C-6746-3C58-BE55-59840E727156}" dt="2025-03-24T14:47:21.203" v="283" actId="20577"/>
+          <ac:spMkLst>
+            <pc:docMk/>
+            <pc:sldMk cId="2488136383" sldId="257"/>
+            <ac:spMk id="7" creationId="{5E0EB798-7206-64F8-2E54-C180D414F540}"/>
+          </ac:spMkLst>
+        </pc:spChg>
+        <pc:spChg chg="add del mod">
+          <ac:chgData name="Sam De Wispelaere" userId="S::r0986076@student.vives.be::e9ee75a4-3b98-416e-a358-897d61f9ac81" providerId="AD" clId="Web-{F2DFAB1C-6746-3C58-BE55-59840E727156}" dt="2025-03-24T14:39:22.717" v="108"/>
+          <ac:spMkLst>
+            <pc:docMk/>
+            <pc:sldMk cId="2488136383" sldId="257"/>
+            <ac:spMk id="8" creationId="{B1ED5C4B-94F3-6D35-AF84-FC022E3AC748}"/>
+          </ac:spMkLst>
+        </pc:spChg>
+        <pc:spChg chg="add mod">
+          <ac:chgData name="Sam De Wispelaere" userId="S::r0986076@student.vives.be::e9ee75a4-3b98-416e-a358-897d61f9ac81" providerId="AD" clId="Web-{F2DFAB1C-6746-3C58-BE55-59840E727156}" dt="2025-03-24T14:44:00.837" v="217" actId="20577"/>
+          <ac:spMkLst>
+            <pc:docMk/>
+            <pc:sldMk cId="2488136383" sldId="257"/>
+            <ac:spMk id="9" creationId="{FDE4E7C7-3505-81BD-1DE2-9A94A9155FD4}"/>
+          </ac:spMkLst>
+        </pc:spChg>
+        <pc:spChg chg="add del mod">
+          <ac:chgData name="Sam De Wispelaere" userId="S::r0986076@student.vives.be::e9ee75a4-3b98-416e-a358-897d61f9ac81" providerId="AD" clId="Web-{F2DFAB1C-6746-3C58-BE55-59840E727156}" dt="2025-03-24T14:43:02.210" v="200"/>
+          <ac:spMkLst>
+            <pc:docMk/>
+            <pc:sldMk cId="2488136383" sldId="257"/>
+            <ac:spMk id="10" creationId="{868C4371-D5AD-2089-D80E-3FACC2F14DCF}"/>
+          </ac:spMkLst>
+        </pc:spChg>
+        <pc:spChg chg="add mod">
+          <ac:chgData name="Sam De Wispelaere" userId="S::r0986076@student.vives.be::e9ee75a4-3b98-416e-a358-897d61f9ac81" providerId="AD" clId="Web-{F2DFAB1C-6746-3C58-BE55-59840E727156}" dt="2025-03-24T14:45:02.245" v="241" actId="1076"/>
+          <ac:spMkLst>
+            <pc:docMk/>
+            <pc:sldMk cId="2488136383" sldId="257"/>
+            <ac:spMk id="11" creationId="{0DD6E799-E6EE-0D04-4D08-C15707FAB966}"/>
+          </ac:spMkLst>
+        </pc:spChg>
+      </pc:sldChg>
+      <pc:sldChg chg="addSp delSp modSp new">
+        <pc:chgData name="Sam De Wispelaere" userId="S::r0986076@student.vives.be::e9ee75a4-3b98-416e-a358-897d61f9ac81" providerId="AD" clId="Web-{F2DFAB1C-6746-3C58-BE55-59840E727156}" dt="2025-03-24T14:59:24.541" v="380" actId="1076"/>
+        <pc:sldMkLst>
+          <pc:docMk/>
+          <pc:sldMk cId="2677107523" sldId="258"/>
+        </pc:sldMkLst>
+        <pc:spChg chg="del">
+          <ac:chgData name="Sam De Wispelaere" userId="S::r0986076@student.vives.be::e9ee75a4-3b98-416e-a358-897d61f9ac81" providerId="AD" clId="Web-{F2DFAB1C-6746-3C58-BE55-59840E727156}" dt="2025-03-24T14:46:37.483" v="261"/>
+          <ac:spMkLst>
+            <pc:docMk/>
+            <pc:sldMk cId="2677107523" sldId="258"/>
+            <ac:spMk id="2" creationId="{D4272E83-4DAC-538E-4D31-14AD57DC9E53}"/>
+          </ac:spMkLst>
+        </pc:spChg>
+        <pc:spChg chg="del">
+          <ac:chgData name="Sam De Wispelaere" userId="S::r0986076@student.vives.be::e9ee75a4-3b98-416e-a358-897d61f9ac81" providerId="AD" clId="Web-{F2DFAB1C-6746-3C58-BE55-59840E727156}" dt="2025-03-24T14:46:47.514" v="262"/>
+          <ac:spMkLst>
+            <pc:docMk/>
+            <pc:sldMk cId="2677107523" sldId="258"/>
+            <ac:spMk id="3" creationId="{59D12FE8-EACB-8FF3-ADA4-29F33EAD3BE2}"/>
+          </ac:spMkLst>
+        </pc:spChg>
+        <pc:spChg chg="add mod">
+          <ac:chgData name="Sam De Wispelaere" userId="S::r0986076@student.vives.be::e9ee75a4-3b98-416e-a358-897d61f9ac81" providerId="AD" clId="Web-{F2DFAB1C-6746-3C58-BE55-59840E727156}" dt="2025-03-24T14:47:08.156" v="279" actId="20577"/>
+          <ac:spMkLst>
+            <pc:docMk/>
+            <pc:sldMk cId="2677107523" sldId="258"/>
+            <ac:spMk id="4" creationId="{4D92B606-6B42-C684-0FA0-2DD926A8E319}"/>
+          </ac:spMkLst>
+        </pc:spChg>
+        <pc:spChg chg="add mod">
+          <ac:chgData name="Sam De Wispelaere" userId="S::r0986076@student.vives.be::e9ee75a4-3b98-416e-a358-897d61f9ac81" providerId="AD" clId="Web-{F2DFAB1C-6746-3C58-BE55-59840E727156}" dt="2025-03-24T14:54:27.874" v="346" actId="20577"/>
+          <ac:spMkLst>
+            <pc:docMk/>
+            <pc:sldMk cId="2677107523" sldId="258"/>
+            <ac:spMk id="6" creationId="{19FEA7B4-26CE-803F-D412-4654AA90A7B1}"/>
+          </ac:spMkLst>
+        </pc:spChg>
+        <pc:spChg chg="add mod">
+          <ac:chgData name="Sam De Wispelaere" userId="S::r0986076@student.vives.be::e9ee75a4-3b98-416e-a358-897d61f9ac81" providerId="AD" clId="Web-{F2DFAB1C-6746-3C58-BE55-59840E727156}" dt="2025-03-24T14:51:47.087" v="313" actId="14100"/>
+          <ac:spMkLst>
+            <pc:docMk/>
+            <pc:sldMk cId="2677107523" sldId="258"/>
+            <ac:spMk id="9" creationId="{E17009D8-F027-A8B8-CE46-C40B7C64608D}"/>
+          </ac:spMkLst>
+        </pc:spChg>
+        <pc:spChg chg="add mod">
+          <ac:chgData name="Sam De Wispelaere" userId="S::r0986076@student.vives.be::e9ee75a4-3b98-416e-a358-897d61f9ac81" providerId="AD" clId="Web-{F2DFAB1C-6746-3C58-BE55-59840E727156}" dt="2025-03-24T14:54:30.437" v="347" actId="20577"/>
+          <ac:spMkLst>
+            <pc:docMk/>
+            <pc:sldMk cId="2677107523" sldId="258"/>
+            <ac:spMk id="10" creationId="{A52EFED8-AE28-C87E-3EE2-1606E9B95768}"/>
+          </ac:spMkLst>
+        </pc:spChg>
+        <pc:spChg chg="add mod">
+          <ac:chgData name="Sam De Wispelaere" userId="S::r0986076@student.vives.be::e9ee75a4-3b98-416e-a358-897d61f9ac81" providerId="AD" clId="Web-{F2DFAB1C-6746-3C58-BE55-59840E727156}" dt="2025-03-24T14:53:30.825" v="345" actId="20577"/>
+          <ac:spMkLst>
+            <pc:docMk/>
+            <pc:sldMk cId="2677107523" sldId="258"/>
+            <ac:spMk id="12" creationId="{6FC933E9-EC58-E0DB-BA31-0BB5349E54C0}"/>
+          </ac:spMkLst>
+        </pc:spChg>
+        <pc:spChg chg="add del mod">
+          <ac:chgData name="Sam De Wispelaere" userId="S::r0986076@student.vives.be::e9ee75a4-3b98-416e-a358-897d61f9ac81" providerId="AD" clId="Web-{F2DFAB1C-6746-3C58-BE55-59840E727156}" dt="2025-03-24T14:55:40.392" v="353"/>
+          <ac:spMkLst>
+            <pc:docMk/>
+            <pc:sldMk cId="2677107523" sldId="258"/>
+            <ac:spMk id="13" creationId="{AA2B9C9E-3484-FD51-D1F1-390CEB30C343}"/>
+          </ac:spMkLst>
+        </pc:spChg>
+        <pc:spChg chg="add del">
+          <ac:chgData name="Sam De Wispelaere" userId="S::r0986076@student.vives.be::e9ee75a4-3b98-416e-a358-897d61f9ac81" providerId="AD" clId="Web-{F2DFAB1C-6746-3C58-BE55-59840E727156}" dt="2025-03-24T14:55:44.564" v="355"/>
+          <ac:spMkLst>
+            <pc:docMk/>
+            <pc:sldMk cId="2677107523" sldId="258"/>
+            <ac:spMk id="15" creationId="{D0BD7DDC-9540-36BE-F698-7A844B16DCBD}"/>
+          </ac:spMkLst>
+        </pc:spChg>
+        <pc:spChg chg="add mod">
+          <ac:chgData name="Sam De Wispelaere" userId="S::r0986076@student.vives.be::e9ee75a4-3b98-416e-a358-897d61f9ac81" providerId="AD" clId="Web-{F2DFAB1C-6746-3C58-BE55-59840E727156}" dt="2025-03-24T14:55:56.705" v="359" actId="20577"/>
+          <ac:spMkLst>
+            <pc:docMk/>
+            <pc:sldMk cId="2677107523" sldId="258"/>
+            <ac:spMk id="16" creationId="{8E2E697B-55A0-BB6D-BF46-3012F6A7F263}"/>
+          </ac:spMkLst>
+        </pc:spChg>
+        <pc:spChg chg="add mod">
+          <ac:chgData name="Sam De Wispelaere" userId="S::r0986076@student.vives.be::e9ee75a4-3b98-416e-a358-897d61f9ac81" providerId="AD" clId="Web-{F2DFAB1C-6746-3C58-BE55-59840E727156}" dt="2025-03-24T14:59:24.541" v="380" actId="1076"/>
+          <ac:spMkLst>
+            <pc:docMk/>
+            <pc:sldMk cId="2677107523" sldId="258"/>
+            <ac:spMk id="17" creationId="{24A7AFC7-700C-B5BB-694B-EBE5C2BA56EB}"/>
+          </ac:spMkLst>
+        </pc:spChg>
+        <pc:picChg chg="add mod modCrop">
+          <ac:chgData name="Sam De Wispelaere" userId="S::r0986076@student.vives.be::e9ee75a4-3b98-416e-a358-897d61f9ac81" providerId="AD" clId="Web-{F2DFAB1C-6746-3C58-BE55-59840E727156}" dt="2025-03-24T14:52:53.684" v="324" actId="1076"/>
+          <ac:picMkLst>
+            <pc:docMk/>
+            <pc:sldMk cId="2677107523" sldId="258"/>
+            <ac:picMk id="5" creationId="{BC9EC517-9906-71F8-EEB7-76FCA8C3C492}"/>
+          </ac:picMkLst>
+        </pc:picChg>
+        <pc:picChg chg="add del mod">
+          <ac:chgData name="Sam De Wispelaere" userId="S::r0986076@student.vives.be::e9ee75a4-3b98-416e-a358-897d61f9ac81" providerId="AD" clId="Web-{F2DFAB1C-6746-3C58-BE55-59840E727156}" dt="2025-03-24T14:51:04.914" v="295"/>
+          <ac:picMkLst>
+            <pc:docMk/>
+            <pc:sldMk cId="2677107523" sldId="258"/>
+            <ac:picMk id="7" creationId="{86A89975-C973-BA47-E50B-19E65356D551}"/>
+          </ac:picMkLst>
+        </pc:picChg>
+      </pc:sldChg>
+      <pc:sldChg chg="addSp delSp modSp new">
+        <pc:chgData name="Sam De Wispelaere" userId="S::r0986076@student.vives.be::e9ee75a4-3b98-416e-a358-897d61f9ac81" providerId="AD" clId="Web-{F2DFAB1C-6746-3C58-BE55-59840E727156}" dt="2025-03-24T15:04:07.551" v="461" actId="20577"/>
+        <pc:sldMkLst>
+          <pc:docMk/>
+          <pc:sldMk cId="1890171273" sldId="259"/>
+        </pc:sldMkLst>
+        <pc:spChg chg="del">
+          <ac:chgData name="Sam De Wispelaere" userId="S::r0986076@student.vives.be::e9ee75a4-3b98-416e-a358-897d61f9ac81" providerId="AD" clId="Web-{F2DFAB1C-6746-3C58-BE55-59840E727156}" dt="2025-03-24T14:58:58.024" v="378"/>
+          <ac:spMkLst>
+            <pc:docMk/>
+            <pc:sldMk cId="1890171273" sldId="259"/>
+            <ac:spMk id="2" creationId="{1283ED9E-0605-A3C9-F9D6-D8218AC36F8F}"/>
+          </ac:spMkLst>
+        </pc:spChg>
+        <pc:spChg chg="del">
+          <ac:chgData name="Sam De Wispelaere" userId="S::r0986076@student.vives.be::e9ee75a4-3b98-416e-a358-897d61f9ac81" providerId="AD" clId="Web-{F2DFAB1C-6746-3C58-BE55-59840E727156}" dt="2025-03-24T14:59:01.384" v="379"/>
+          <ac:spMkLst>
+            <pc:docMk/>
+            <pc:sldMk cId="1890171273" sldId="259"/>
+            <ac:spMk id="3" creationId="{C917347C-2D92-62CA-CF5F-E6659863B63F}"/>
+          </ac:spMkLst>
+        </pc:spChg>
+        <pc:spChg chg="add mod">
+          <ac:chgData name="Sam De Wispelaere" userId="S::r0986076@student.vives.be::e9ee75a4-3b98-416e-a358-897d61f9ac81" providerId="AD" clId="Web-{F2DFAB1C-6746-3C58-BE55-59840E727156}" dt="2025-03-24T15:00:17.496" v="405" actId="20577"/>
+          <ac:spMkLst>
+            <pc:docMk/>
+            <pc:sldMk cId="1890171273" sldId="259"/>
+            <ac:spMk id="4" creationId="{01EF5FD8-7DF9-B4F9-C9E1-C688A8ED99F4}"/>
+          </ac:spMkLst>
+        </pc:spChg>
+        <pc:spChg chg="add mod">
+          <ac:chgData name="Sam De Wispelaere" userId="S::r0986076@student.vives.be::e9ee75a4-3b98-416e-a358-897d61f9ac81" providerId="AD" clId="Web-{F2DFAB1C-6746-3C58-BE55-59840E727156}" dt="2025-03-24T15:04:07.551" v="461" actId="20577"/>
+          <ac:spMkLst>
+            <pc:docMk/>
+            <pc:sldMk cId="1890171273" sldId="259"/>
+            <ac:spMk id="5" creationId="{1E5175BD-D8E7-F22E-0E75-3AB93BCFCED2}"/>
+          </ac:spMkLst>
+        </pc:spChg>
+        <pc:spChg chg="add mod">
+          <ac:chgData name="Sam De Wispelaere" userId="S::r0986076@student.vives.be::e9ee75a4-3b98-416e-a358-897d61f9ac81" providerId="AD" clId="Web-{F2DFAB1C-6746-3C58-BE55-59840E727156}" dt="2025-03-24T15:03:24.784" v="455" actId="1076"/>
+          <ac:spMkLst>
+            <pc:docMk/>
+            <pc:sldMk cId="1890171273" sldId="259"/>
+            <ac:spMk id="7" creationId="{9C96BE31-7572-8DE0-C7E0-553D48B1FA0F}"/>
+          </ac:spMkLst>
+        </pc:spChg>
+      </pc:sldChg>
+      <pc:sldMasterChg chg="add del addSldLayout delSldLayout">
+        <pc:chgData name="Sam De Wispelaere" userId="S::r0986076@student.vives.be::e9ee75a4-3b98-416e-a358-897d61f9ac81" providerId="AD" clId="Web-{F2DFAB1C-6746-3C58-BE55-59840E727156}" dt="2025-03-24T14:37:05.838" v="39"/>
+        <pc:sldMasterMkLst>
+          <pc:docMk/>
+          <pc:sldMasterMk cId="663473969" sldId="2147483648"/>
+        </pc:sldMasterMkLst>
+        <pc:sldLayoutChg chg="add del">
+          <pc:chgData name="Sam De Wispelaere" userId="S::r0986076@student.vives.be::e9ee75a4-3b98-416e-a358-897d61f9ac81" providerId="AD" clId="Web-{F2DFAB1C-6746-3C58-BE55-59840E727156}" dt="2025-03-24T14:37:05.838" v="39"/>
+          <pc:sldLayoutMkLst>
+            <pc:docMk/>
+            <pc:sldMasterMk cId="663473969" sldId="2147483648"/>
+            <pc:sldLayoutMk cId="1308989706" sldId="2147483649"/>
+          </pc:sldLayoutMkLst>
+        </pc:sldLayoutChg>
+        <pc:sldLayoutChg chg="add del">
+          <pc:chgData name="Sam De Wispelaere" userId="S::r0986076@student.vives.be::e9ee75a4-3b98-416e-a358-897d61f9ac81" providerId="AD" clId="Web-{F2DFAB1C-6746-3C58-BE55-59840E727156}" dt="2025-03-24T14:37:05.838" v="39"/>
+          <pc:sldLayoutMkLst>
+            <pc:docMk/>
+            <pc:sldMasterMk cId="663473969" sldId="2147483648"/>
+            <pc:sldLayoutMk cId="350409375" sldId="2147483650"/>
+          </pc:sldLayoutMkLst>
+        </pc:sldLayoutChg>
+        <pc:sldLayoutChg chg="add del">
+          <pc:chgData name="Sam De Wispelaere" userId="S::r0986076@student.vives.be::e9ee75a4-3b98-416e-a358-897d61f9ac81" providerId="AD" clId="Web-{F2DFAB1C-6746-3C58-BE55-59840E727156}" dt="2025-03-24T14:37:05.838" v="39"/>
+          <pc:sldLayoutMkLst>
+            <pc:docMk/>
+            <pc:sldMasterMk cId="663473969" sldId="2147483648"/>
+            <pc:sldLayoutMk cId="2986431756" sldId="2147483651"/>
+          </pc:sldLayoutMkLst>
+        </pc:sldLayoutChg>
+        <pc:sldLayoutChg chg="add del">
+          <pc:chgData name="Sam De Wispelaere" userId="S::r0986076@student.vives.be::e9ee75a4-3b98-416e-a358-897d61f9ac81" providerId="AD" clId="Web-{F2DFAB1C-6746-3C58-BE55-59840E727156}" dt="2025-03-24T14:37:05.838" v="39"/>
+          <pc:sldLayoutMkLst>
+            <pc:docMk/>
+            <pc:sldMasterMk cId="663473969" sldId="2147483648"/>
+            <pc:sldLayoutMk cId="367210854" sldId="2147483652"/>
+          </pc:sldLayoutMkLst>
+        </pc:sldLayoutChg>
+        <pc:sldLayoutChg chg="add del">
+          <pc:chgData name="Sam De Wispelaere" userId="S::r0986076@student.vives.be::e9ee75a4-3b98-416e-a358-897d61f9ac81" providerId="AD" clId="Web-{F2DFAB1C-6746-3C58-BE55-59840E727156}" dt="2025-03-24T14:37:05.838" v="39"/>
+          <pc:sldLayoutMkLst>
+            <pc:docMk/>
+            <pc:sldMasterMk cId="663473969" sldId="2147483648"/>
+            <pc:sldLayoutMk cId="760695061" sldId="2147483653"/>
+          </pc:sldLayoutMkLst>
+        </pc:sldLayoutChg>
+        <pc:sldLayoutChg chg="add del">
+          <pc:chgData name="Sam De Wispelaere" userId="S::r0986076@student.vives.be::e9ee75a4-3b98-416e-a358-897d61f9ac81" providerId="AD" clId="Web-{F2DFAB1C-6746-3C58-BE55-59840E727156}" dt="2025-03-24T14:37:05.838" v="39"/>
+          <pc:sldLayoutMkLst>
+            <pc:docMk/>
+            <pc:sldMasterMk cId="663473969" sldId="2147483648"/>
+            <pc:sldLayoutMk cId="2385443403" sldId="2147483654"/>
+          </pc:sldLayoutMkLst>
+        </pc:sldLayoutChg>
+        <pc:sldLayoutChg chg="add del">
+          <pc:chgData name="Sam De Wispelaere" userId="S::r0986076@student.vives.be::e9ee75a4-3b98-416e-a358-897d61f9ac81" providerId="AD" clId="Web-{F2DFAB1C-6746-3C58-BE55-59840E727156}" dt="2025-03-24T14:37:05.838" v="39"/>
+          <pc:sldLayoutMkLst>
+            <pc:docMk/>
+            <pc:sldMasterMk cId="663473969" sldId="2147483648"/>
+            <pc:sldLayoutMk cId="4263266532" sldId="2147483655"/>
+          </pc:sldLayoutMkLst>
+        </pc:sldLayoutChg>
+        <pc:sldLayoutChg chg="add del">
+          <pc:chgData name="Sam De Wispelaere" userId="S::r0986076@student.vives.be::e9ee75a4-3b98-416e-a358-897d61f9ac81" providerId="AD" clId="Web-{F2DFAB1C-6746-3C58-BE55-59840E727156}" dt="2025-03-24T14:37:05.838" v="39"/>
+          <pc:sldLayoutMkLst>
+            <pc:docMk/>
+            <pc:sldMasterMk cId="663473969" sldId="2147483648"/>
+            <pc:sldLayoutMk cId="394922470" sldId="2147483656"/>
+          </pc:sldLayoutMkLst>
+        </pc:sldLayoutChg>
+        <pc:sldLayoutChg chg="add del">
+          <pc:chgData name="Sam De Wispelaere" userId="S::r0986076@student.vives.be::e9ee75a4-3b98-416e-a358-897d61f9ac81" providerId="AD" clId="Web-{F2DFAB1C-6746-3C58-BE55-59840E727156}" dt="2025-03-24T14:37:05.838" v="39"/>
+          <pc:sldLayoutMkLst>
+            <pc:docMk/>
+            <pc:sldMasterMk cId="663473969" sldId="2147483648"/>
+            <pc:sldLayoutMk cId="2889705571" sldId="2147483657"/>
+          </pc:sldLayoutMkLst>
+        </pc:sldLayoutChg>
+        <pc:sldLayoutChg chg="add del">
+          <pc:chgData name="Sam De Wispelaere" userId="S::r0986076@student.vives.be::e9ee75a4-3b98-416e-a358-897d61f9ac81" providerId="AD" clId="Web-{F2DFAB1C-6746-3C58-BE55-59840E727156}" dt="2025-03-24T14:37:05.838" v="39"/>
+          <pc:sldLayoutMkLst>
+            <pc:docMk/>
+            <pc:sldMasterMk cId="663473969" sldId="2147483648"/>
+            <pc:sldLayoutMk cId="2356645031" sldId="2147483658"/>
+          </pc:sldLayoutMkLst>
+        </pc:sldLayoutChg>
+        <pc:sldLayoutChg chg="add del">
+          <pc:chgData name="Sam De Wispelaere" userId="S::r0986076@student.vives.be::e9ee75a4-3b98-416e-a358-897d61f9ac81" providerId="AD" clId="Web-{F2DFAB1C-6746-3C58-BE55-59840E727156}" dt="2025-03-24T14:37:05.838" v="39"/>
+          <pc:sldLayoutMkLst>
+            <pc:docMk/>
+            <pc:sldMasterMk cId="663473969" sldId="2147483648"/>
+            <pc:sldLayoutMk cId="2398762794" sldId="2147483659"/>
+          </pc:sldLayoutMkLst>
+        </pc:sldLayoutChg>
+      </pc:sldMasterChg>
+      <pc:sldMasterChg chg="add del addSldLayout delSldLayout">
+        <pc:chgData name="Sam De Wispelaere" userId="S::r0986076@student.vives.be::e9ee75a4-3b98-416e-a358-897d61f9ac81" providerId="AD" clId="Web-{F2DFAB1C-6746-3C58-BE55-59840E727156}" dt="2025-03-24T14:37:05.838" v="39"/>
+        <pc:sldMasterMkLst>
+          <pc:docMk/>
+          <pc:sldMasterMk cId="3171135543" sldId="2147483660"/>
+        </pc:sldMasterMkLst>
+        <pc:sldLayoutChg chg="add del">
+          <pc:chgData name="Sam De Wispelaere" userId="S::r0986076@student.vives.be::e9ee75a4-3b98-416e-a358-897d61f9ac81" providerId="AD" clId="Web-{F2DFAB1C-6746-3C58-BE55-59840E727156}" dt="2025-03-24T14:37:05.838" v="39"/>
+          <pc:sldLayoutMkLst>
+            <pc:docMk/>
+            <pc:sldMasterMk cId="3171135543" sldId="2147483660"/>
+            <pc:sldLayoutMk cId="1739597196" sldId="2147483661"/>
+          </pc:sldLayoutMkLst>
+        </pc:sldLayoutChg>
+        <pc:sldLayoutChg chg="add del">
+          <pc:chgData name="Sam De Wispelaere" userId="S::r0986076@student.vives.be::e9ee75a4-3b98-416e-a358-897d61f9ac81" providerId="AD" clId="Web-{F2DFAB1C-6746-3C58-BE55-59840E727156}" dt="2025-03-24T14:37:05.838" v="39"/>
+          <pc:sldLayoutMkLst>
+            <pc:docMk/>
+            <pc:sldMasterMk cId="3171135543" sldId="2147483660"/>
+            <pc:sldLayoutMk cId="1556870153" sldId="2147483662"/>
+          </pc:sldLayoutMkLst>
+        </pc:sldLayoutChg>
+        <pc:sldLayoutChg chg="add del">
+          <pc:chgData name="Sam De Wispelaere" userId="S::r0986076@student.vives.be::e9ee75a4-3b98-416e-a358-897d61f9ac81" providerId="AD" clId="Web-{F2DFAB1C-6746-3C58-BE55-59840E727156}" dt="2025-03-24T14:37:05.838" v="39"/>
+          <pc:sldLayoutMkLst>
+            <pc:docMk/>
+            <pc:sldMasterMk cId="3171135543" sldId="2147483660"/>
+            <pc:sldLayoutMk cId="2167363364" sldId="2147483663"/>
+          </pc:sldLayoutMkLst>
+        </pc:sldLayoutChg>
+        <pc:sldLayoutChg chg="add del">
+          <pc:chgData name="Sam De Wispelaere" userId="S::r0986076@student.vives.be::e9ee75a4-3b98-416e-a358-897d61f9ac81" providerId="AD" clId="Web-{F2DFAB1C-6746-3C58-BE55-59840E727156}" dt="2025-03-24T14:37:05.838" v="39"/>
+          <pc:sldLayoutMkLst>
+            <pc:docMk/>
+            <pc:sldMasterMk cId="3171135543" sldId="2147483660"/>
+            <pc:sldLayoutMk cId="1832262232" sldId="2147483664"/>
+          </pc:sldLayoutMkLst>
+        </pc:sldLayoutChg>
+        <pc:sldLayoutChg chg="add del">
+          <pc:chgData name="Sam De Wispelaere" userId="S::r0986076@student.vives.be::e9ee75a4-3b98-416e-a358-897d61f9ac81" providerId="AD" clId="Web-{F2DFAB1C-6746-3C58-BE55-59840E727156}" dt="2025-03-24T14:37:05.838" v="39"/>
+          <pc:sldLayoutMkLst>
+            <pc:docMk/>
+            <pc:sldMasterMk cId="3171135543" sldId="2147483660"/>
+            <pc:sldLayoutMk cId="2260465333" sldId="2147483665"/>
+          </pc:sldLayoutMkLst>
+        </pc:sldLayoutChg>
+        <pc:sldLayoutChg chg="add del">
+          <pc:chgData name="Sam De Wispelaere" userId="S::r0986076@student.vives.be::e9ee75a4-3b98-416e-a358-897d61f9ac81" providerId="AD" clId="Web-{F2DFAB1C-6746-3C58-BE55-59840E727156}" dt="2025-03-24T14:37:05.838" v="39"/>
+          <pc:sldLayoutMkLst>
+            <pc:docMk/>
+            <pc:sldMasterMk cId="3171135543" sldId="2147483660"/>
+            <pc:sldLayoutMk cId="2078415113" sldId="2147483666"/>
+          </pc:sldLayoutMkLst>
+        </pc:sldLayoutChg>
+        <pc:sldLayoutChg chg="add del">
+          <pc:chgData name="Sam De Wispelaere" userId="S::r0986076@student.vives.be::e9ee75a4-3b98-416e-a358-897d61f9ac81" providerId="AD" clId="Web-{F2DFAB1C-6746-3C58-BE55-59840E727156}" dt="2025-03-24T14:37:05.838" v="39"/>
+          <pc:sldLayoutMkLst>
+            <pc:docMk/>
+            <pc:sldMasterMk cId="3171135543" sldId="2147483660"/>
+            <pc:sldLayoutMk cId="3148716289" sldId="2147483667"/>
+          </pc:sldLayoutMkLst>
+        </pc:sldLayoutChg>
+        <pc:sldLayoutChg chg="add del">
+          <pc:chgData name="Sam De Wispelaere" userId="S::r0986076@student.vives.be::e9ee75a4-3b98-416e-a358-897d61f9ac81" providerId="AD" clId="Web-{F2DFAB1C-6746-3C58-BE55-59840E727156}" dt="2025-03-24T14:37:05.838" v="39"/>
+          <pc:sldLayoutMkLst>
+            <pc:docMk/>
+            <pc:sldMasterMk cId="3171135543" sldId="2147483660"/>
+            <pc:sldLayoutMk cId="3282828481" sldId="2147483668"/>
+          </pc:sldLayoutMkLst>
+        </pc:sldLayoutChg>
+        <pc:sldLayoutChg chg="add del">
+          <pc:chgData name="Sam De Wispelaere" userId="S::r0986076@student.vives.be::e9ee75a4-3b98-416e-a358-897d61f9ac81" providerId="AD" clId="Web-{F2DFAB1C-6746-3C58-BE55-59840E727156}" dt="2025-03-24T14:37:05.838" v="39"/>
+          <pc:sldLayoutMkLst>
+            <pc:docMk/>
+            <pc:sldMasterMk cId="3171135543" sldId="2147483660"/>
+            <pc:sldLayoutMk cId="2469191316" sldId="2147483669"/>
+          </pc:sldLayoutMkLst>
+        </pc:sldLayoutChg>
+        <pc:sldLayoutChg chg="add del">
+          <pc:chgData name="Sam De Wispelaere" userId="S::r0986076@student.vives.be::e9ee75a4-3b98-416e-a358-897d61f9ac81" providerId="AD" clId="Web-{F2DFAB1C-6746-3C58-BE55-59840E727156}" dt="2025-03-24T14:37:05.838" v="39"/>
+          <pc:sldLayoutMkLst>
+            <pc:docMk/>
+            <pc:sldMasterMk cId="3171135543" sldId="2147483660"/>
+            <pc:sldLayoutMk cId="2514243385" sldId="2147483670"/>
+          </pc:sldLayoutMkLst>
+        </pc:sldLayoutChg>
+        <pc:sldLayoutChg chg="add del">
+          <pc:chgData name="Sam De Wispelaere" userId="S::r0986076@student.vives.be::e9ee75a4-3b98-416e-a358-897d61f9ac81" providerId="AD" clId="Web-{F2DFAB1C-6746-3C58-BE55-59840E727156}" dt="2025-03-24T14:37:05.838" v="39"/>
+          <pc:sldLayoutMkLst>
+            <pc:docMk/>
+            <pc:sldMasterMk cId="3171135543" sldId="2147483660"/>
+            <pc:sldLayoutMk cId="2854491018" sldId="2147483671"/>
+          </pc:sldLayoutMkLst>
+        </pc:sldLayoutChg>
+      </pc:sldMasterChg>
+      <pc:sldMasterChg chg="add del addSldLayout delSldLayout">
+        <pc:chgData name="Sam De Wispelaere" userId="S::r0986076@student.vives.be::e9ee75a4-3b98-416e-a358-897d61f9ac81" providerId="AD" clId="Web-{F2DFAB1C-6746-3C58-BE55-59840E727156}" dt="2025-03-24T14:37:00.556" v="37"/>
+        <pc:sldMasterMkLst>
+          <pc:docMk/>
+          <pc:sldMasterMk cId="3097924602" sldId="2147483722"/>
+        </pc:sldMasterMkLst>
+        <pc:sldLayoutChg chg="add del">
+          <pc:chgData name="Sam De Wispelaere" userId="S::r0986076@student.vives.be::e9ee75a4-3b98-416e-a358-897d61f9ac81" providerId="AD" clId="Web-{F2DFAB1C-6746-3C58-BE55-59840E727156}" dt="2025-03-24T14:37:00.556" v="37"/>
+          <pc:sldLayoutMkLst>
+            <pc:docMk/>
+            <pc:sldMasterMk cId="3097924602" sldId="2147483722"/>
+            <pc:sldLayoutMk cId="1580337075" sldId="2147483711"/>
+          </pc:sldLayoutMkLst>
+        </pc:sldLayoutChg>
+        <pc:sldLayoutChg chg="add del">
+          <pc:chgData name="Sam De Wispelaere" userId="S::r0986076@student.vives.be::e9ee75a4-3b98-416e-a358-897d61f9ac81" providerId="AD" clId="Web-{F2DFAB1C-6746-3C58-BE55-59840E727156}" dt="2025-03-24T14:37:00.556" v="37"/>
+          <pc:sldLayoutMkLst>
+            <pc:docMk/>
+            <pc:sldMasterMk cId="3097924602" sldId="2147483722"/>
+            <pc:sldLayoutMk cId="2473140465" sldId="2147483712"/>
+          </pc:sldLayoutMkLst>
+        </pc:sldLayoutChg>
+        <pc:sldLayoutChg chg="add del">
+          <pc:chgData name="Sam De Wispelaere" userId="S::r0986076@student.vives.be::e9ee75a4-3b98-416e-a358-897d61f9ac81" providerId="AD" clId="Web-{F2DFAB1C-6746-3C58-BE55-59840E727156}" dt="2025-03-24T14:37:00.556" v="37"/>
+          <pc:sldLayoutMkLst>
+            <pc:docMk/>
+            <pc:sldMasterMk cId="3097924602" sldId="2147483722"/>
+            <pc:sldLayoutMk cId="1875554910" sldId="2147483713"/>
+          </pc:sldLayoutMkLst>
+        </pc:sldLayoutChg>
+        <pc:sldLayoutChg chg="add del">
+          <pc:chgData name="Sam De Wispelaere" userId="S::r0986076@student.vives.be::e9ee75a4-3b98-416e-a358-897d61f9ac81" providerId="AD" clId="Web-{F2DFAB1C-6746-3C58-BE55-59840E727156}" dt="2025-03-24T14:37:00.556" v="37"/>
+          <pc:sldLayoutMkLst>
+            <pc:docMk/>
+            <pc:sldMasterMk cId="3097924602" sldId="2147483722"/>
+            <pc:sldLayoutMk cId="1953264964" sldId="2147483714"/>
+          </pc:sldLayoutMkLst>
+        </pc:sldLayoutChg>
+        <pc:sldLayoutChg chg="add del">
+          <pc:chgData name="Sam De Wispelaere" userId="S::r0986076@student.vives.be::e9ee75a4-3b98-416e-a358-897d61f9ac81" providerId="AD" clId="Web-{F2DFAB1C-6746-3C58-BE55-59840E727156}" dt="2025-03-24T14:37:00.556" v="37"/>
+          <pc:sldLayoutMkLst>
+            <pc:docMk/>
+            <pc:sldMasterMk cId="3097924602" sldId="2147483722"/>
+            <pc:sldLayoutMk cId="2139931613" sldId="2147483715"/>
+          </pc:sldLayoutMkLst>
+        </pc:sldLayoutChg>
+        <pc:sldLayoutChg chg="add del">
+          <pc:chgData name="Sam De Wispelaere" userId="S::r0986076@student.vives.be::e9ee75a4-3b98-416e-a358-897d61f9ac81" providerId="AD" clId="Web-{F2DFAB1C-6746-3C58-BE55-59840E727156}" dt="2025-03-24T14:37:00.556" v="37"/>
+          <pc:sldLayoutMkLst>
+            <pc:docMk/>
+            <pc:sldMasterMk cId="3097924602" sldId="2147483722"/>
+            <pc:sldLayoutMk cId="1512371093" sldId="2147483716"/>
+          </pc:sldLayoutMkLst>
+        </pc:sldLayoutChg>
+        <pc:sldLayoutChg chg="add del">
+          <pc:chgData name="Sam De Wispelaere" userId="S::r0986076@student.vives.be::e9ee75a4-3b98-416e-a358-897d61f9ac81" providerId="AD" clId="Web-{F2DFAB1C-6746-3C58-BE55-59840E727156}" dt="2025-03-24T14:37:00.556" v="37"/>
+          <pc:sldLayoutMkLst>
+            <pc:docMk/>
+            <pc:sldMasterMk cId="3097924602" sldId="2147483722"/>
+            <pc:sldLayoutMk cId="3013653960" sldId="2147483717"/>
+          </pc:sldLayoutMkLst>
+        </pc:sldLayoutChg>
+        <pc:sldLayoutChg chg="add del">
+          <pc:chgData name="Sam De Wispelaere" userId="S::r0986076@student.vives.be::e9ee75a4-3b98-416e-a358-897d61f9ac81" providerId="AD" clId="Web-{F2DFAB1C-6746-3C58-BE55-59840E727156}" dt="2025-03-24T14:37:00.556" v="37"/>
+          <pc:sldLayoutMkLst>
+            <pc:docMk/>
+            <pc:sldMasterMk cId="3097924602" sldId="2147483722"/>
+            <pc:sldLayoutMk cId="239127920" sldId="2147483718"/>
+          </pc:sldLayoutMkLst>
+        </pc:sldLayoutChg>
+        <pc:sldLayoutChg chg="add del">
+          <pc:chgData name="Sam De Wispelaere" userId="S::r0986076@student.vives.be::e9ee75a4-3b98-416e-a358-897d61f9ac81" providerId="AD" clId="Web-{F2DFAB1C-6746-3C58-BE55-59840E727156}" dt="2025-03-24T14:37:00.556" v="37"/>
+          <pc:sldLayoutMkLst>
+            <pc:docMk/>
+            <pc:sldMasterMk cId="3097924602" sldId="2147483722"/>
+            <pc:sldLayoutMk cId="4178908393" sldId="2147483719"/>
+          </pc:sldLayoutMkLst>
+        </pc:sldLayoutChg>
+        <pc:sldLayoutChg chg="add del">
+          <pc:chgData name="Sam De Wispelaere" userId="S::r0986076@student.vives.be::e9ee75a4-3b98-416e-a358-897d61f9ac81" providerId="AD" clId="Web-{F2DFAB1C-6746-3C58-BE55-59840E727156}" dt="2025-03-24T14:37:00.556" v="37"/>
+          <pc:sldLayoutMkLst>
+            <pc:docMk/>
+            <pc:sldMasterMk cId="3097924602" sldId="2147483722"/>
+            <pc:sldLayoutMk cId="3303907473" sldId="2147483720"/>
+          </pc:sldLayoutMkLst>
+        </pc:sldLayoutChg>
+        <pc:sldLayoutChg chg="add del">
+          <pc:chgData name="Sam De Wispelaere" userId="S::r0986076@student.vives.be::e9ee75a4-3b98-416e-a358-897d61f9ac81" providerId="AD" clId="Web-{F2DFAB1C-6746-3C58-BE55-59840E727156}" dt="2025-03-24T14:37:00.556" v="37"/>
+          <pc:sldLayoutMkLst>
+            <pc:docMk/>
+            <pc:sldMasterMk cId="3097924602" sldId="2147483722"/>
+            <pc:sldLayoutMk cId="2272018120" sldId="2147483721"/>
+          </pc:sldLayoutMkLst>
+        </pc:sldLayoutChg>
+      </pc:sldMasterChg>
+    </pc:docChg>
+  </pc:docChgLst>
+</pc:chgInfo>
+</file>
+
 <file path=ppt/slideLayouts/slideLayout1.xml><?xml version="1.0" encoding="utf-8"?>
 <p:sldLayout xmlns:a="http://schemas.openxmlformats.org/drawingml/2006/main" xmlns:r="http://schemas.openxmlformats.org/officeDocument/2006/relationships" xmlns:p="http://schemas.openxmlformats.org/presentationml/2006/main" type="title" preserve="1">
   <p:cSld name="Titeldia">
@@ -261,7 +976,7 @@
           <a:p>
             <a:fld id="{C5CC8023-CF4E-4A1F-BCFB-3133EBC3D918}" type="datetimeFigureOut">
               <a:rPr lang="nl-BE" smtClean="0"/>
-              <a:t>23/03/2025</a:t>
+              <a:t>24/03/2025</a:t>
             </a:fld>
             <a:endParaRPr lang="nl-BE"/>
           </a:p>
@@ -461,7 +1176,7 @@
           <a:p>
             <a:fld id="{C5CC8023-CF4E-4A1F-BCFB-3133EBC3D918}" type="datetimeFigureOut">
               <a:rPr lang="nl-BE" smtClean="0"/>
-              <a:t>23/03/2025</a:t>
+              <a:t>24/03/2025</a:t>
             </a:fld>
             <a:endParaRPr lang="nl-BE"/>
           </a:p>
@@ -671,7 +1386,7 @@
           <a:p>
             <a:fld id="{C5CC8023-CF4E-4A1F-BCFB-3133EBC3D918}" type="datetimeFigureOut">
               <a:rPr lang="nl-BE" smtClean="0"/>
-              <a:t>23/03/2025</a:t>
+              <a:t>24/03/2025</a:t>
             </a:fld>
             <a:endParaRPr lang="nl-BE"/>
           </a:p>
@@ -871,7 +1586,7 @@
           <a:p>
             <a:fld id="{C5CC8023-CF4E-4A1F-BCFB-3133EBC3D918}" type="datetimeFigureOut">
               <a:rPr lang="nl-BE" smtClean="0"/>
-              <a:t>23/03/2025</a:t>
+              <a:t>24/03/2025</a:t>
             </a:fld>
             <a:endParaRPr lang="nl-BE"/>
           </a:p>
@@ -1147,7 +1862,7 @@
           <a:p>
             <a:fld id="{C5CC8023-CF4E-4A1F-BCFB-3133EBC3D918}" type="datetimeFigureOut">
               <a:rPr lang="nl-BE" smtClean="0"/>
-              <a:t>23/03/2025</a:t>
+              <a:t>24/03/2025</a:t>
             </a:fld>
             <a:endParaRPr lang="nl-BE"/>
           </a:p>
@@ -1415,7 +2130,7 @@
           <a:p>
             <a:fld id="{C5CC8023-CF4E-4A1F-BCFB-3133EBC3D918}" type="datetimeFigureOut">
               <a:rPr lang="nl-BE" smtClean="0"/>
-              <a:t>23/03/2025</a:t>
+              <a:t>24/03/2025</a:t>
             </a:fld>
             <a:endParaRPr lang="nl-BE"/>
           </a:p>
@@ -1830,7 +2545,7 @@
           <a:p>
             <a:fld id="{C5CC8023-CF4E-4A1F-BCFB-3133EBC3D918}" type="datetimeFigureOut">
               <a:rPr lang="nl-BE" smtClean="0"/>
-              <a:t>23/03/2025</a:t>
+              <a:t>24/03/2025</a:t>
             </a:fld>
             <a:endParaRPr lang="nl-BE"/>
           </a:p>
@@ -1972,7 +2687,7 @@
           <a:p>
             <a:fld id="{C5CC8023-CF4E-4A1F-BCFB-3133EBC3D918}" type="datetimeFigureOut">
               <a:rPr lang="nl-BE" smtClean="0"/>
-              <a:t>23/03/2025</a:t>
+              <a:t>24/03/2025</a:t>
             </a:fld>
             <a:endParaRPr lang="nl-BE"/>
           </a:p>
@@ -2085,7 +2800,7 @@
           <a:p>
             <a:fld id="{C5CC8023-CF4E-4A1F-BCFB-3133EBC3D918}" type="datetimeFigureOut">
               <a:rPr lang="nl-BE" smtClean="0"/>
-              <a:t>23/03/2025</a:t>
+              <a:t>24/03/2025</a:t>
             </a:fld>
             <a:endParaRPr lang="nl-BE"/>
           </a:p>
@@ -2398,7 +3113,7 @@
           <a:p>
             <a:fld id="{C5CC8023-CF4E-4A1F-BCFB-3133EBC3D918}" type="datetimeFigureOut">
               <a:rPr lang="nl-BE" smtClean="0"/>
-              <a:t>23/03/2025</a:t>
+              <a:t>24/03/2025</a:t>
             </a:fld>
             <a:endParaRPr lang="nl-BE"/>
           </a:p>
@@ -2687,7 +3402,7 @@
           <a:p>
             <a:fld id="{C5CC8023-CF4E-4A1F-BCFB-3133EBC3D918}" type="datetimeFigureOut">
               <a:rPr lang="nl-BE" smtClean="0"/>
-              <a:t>23/03/2025</a:t>
+              <a:t>24/03/2025</a:t>
             </a:fld>
             <a:endParaRPr lang="nl-BE"/>
           </a:p>
@@ -2930,7 +3645,7 @@
           <a:p>
             <a:fld id="{C5CC8023-CF4E-4A1F-BCFB-3133EBC3D918}" type="datetimeFigureOut">
               <a:rPr lang="nl-BE" smtClean="0"/>
-              <a:t>23/03/2025</a:t>
+              <a:t>24/03/2025</a:t>
             </a:fld>
             <a:endParaRPr lang="nl-BE"/>
           </a:p>
@@ -3349,51 +4064,137 @@
       </p:grpSpPr>
       <p:sp>
         <p:nvSpPr>
-          <p:cNvPr id="2" name="Titel 1">
-            <a:extLst>
-              <a:ext uri="{FF2B5EF4-FFF2-40B4-BE49-F238E27FC236}">
-                <a16:creationId xmlns:a16="http://schemas.microsoft.com/office/drawing/2014/main" id="{CCB66148-232A-4279-84DE-CF69E63D92C8}"/>
-              </a:ext>
-            </a:extLst>
-          </p:cNvPr>
-          <p:cNvSpPr>
-            <a:spLocks noGrp="1"/>
-          </p:cNvSpPr>
-          <p:nvPr>
-            <p:ph type="ctrTitle"/>
-          </p:nvPr>
-        </p:nvSpPr>
-        <p:spPr/>
-        <p:txBody>
-          <a:bodyPr/>
-          <a:lstStyle/>
-          <a:p>
-            <a:endParaRPr lang="nl-BE"/>
-          </a:p>
-        </p:txBody>
-      </p:sp>
-      <p:sp>
-        <p:nvSpPr>
-          <p:cNvPr id="3" name="Ondertitel 2">
-            <a:extLst>
-              <a:ext uri="{FF2B5EF4-FFF2-40B4-BE49-F238E27FC236}">
-                <a16:creationId xmlns:a16="http://schemas.microsoft.com/office/drawing/2014/main" id="{504B3B01-EFA9-44B8-A7D0-F7C7F6D43E9E}"/>
-              </a:ext>
-            </a:extLst>
-          </p:cNvPr>
-          <p:cNvSpPr>
-            <a:spLocks noGrp="1"/>
-          </p:cNvSpPr>
-          <p:nvPr>
-            <p:ph type="subTitle" idx="1"/>
-          </p:nvPr>
-        </p:nvSpPr>
-        <p:spPr/>
-        <p:txBody>
-          <a:bodyPr/>
-          <a:lstStyle/>
-          <a:p>
-            <a:endParaRPr lang="nl-BE"/>
+          <p:cNvPr id="6" name="Tekstvak 5">
+            <a:extLst>
+              <a:ext uri="{FF2B5EF4-FFF2-40B4-BE49-F238E27FC236}">
+                <a16:creationId xmlns:a16="http://schemas.microsoft.com/office/drawing/2014/main" id="{FC3E0FB7-59DA-56C6-51AD-4CA40AB4462E}"/>
+              </a:ext>
+            </a:extLst>
+          </p:cNvPr>
+          <p:cNvSpPr txBox="1"/>
+          <p:nvPr/>
+        </p:nvSpPr>
+        <p:spPr>
+          <a:xfrm>
+            <a:off x="-6474" y="-3304"/>
+            <a:ext cx="12198473" cy="769441"/>
+          </a:xfrm>
+          <a:prstGeom prst="rect">
+            <a:avLst/>
+          </a:prstGeom>
+          <a:noFill/>
+        </p:spPr>
+        <p:txBody>
+          <a:bodyPr rot="0" spcFirstLastPara="0" vertOverflow="overflow" horzOverflow="overflow" vert="horz" wrap="square" lIns="91440" tIns="45720" rIns="91440" bIns="45720" numCol="1" spcCol="0" rtlCol="0" fromWordArt="0" anchor="t" anchorCtr="0" forceAA="0" compatLnSpc="1">
+            <a:prstTxWarp prst="textNoShape">
+              <a:avLst/>
+            </a:prstTxWarp>
+            <a:spAutoFit/>
+          </a:bodyPr>
+          <a:lstStyle/>
+          <a:p>
+            <a:pPr algn="ctr"/>
+            <a:r>
+              <a:rPr lang="nl-NL" sz="4400" b="1" dirty="0">
+                <a:latin typeface="Calibri"/>
+                <a:ea typeface="Calibri"/>
+                <a:cs typeface="Calibri"/>
+              </a:rPr>
+              <a:t>Trap The Cat</a:t>
+            </a:r>
+            <a:endParaRPr lang="nl-NL" sz="3200" b="1">
+              <a:latin typeface="Calibri Light"/>
+              <a:ea typeface="Calibri" panose="020F0502020204030204"/>
+              <a:cs typeface="Calibri" panose="020F0502020204030204"/>
+            </a:endParaRPr>
+          </a:p>
+        </p:txBody>
+      </p:sp>
+      <p:pic>
+        <p:nvPicPr>
+          <p:cNvPr id="2" name="Afbeelding 1">
+            <a:extLst>
+              <a:ext uri="{FF2B5EF4-FFF2-40B4-BE49-F238E27FC236}">
+                <a16:creationId xmlns:a16="http://schemas.microsoft.com/office/drawing/2014/main" id="{2A08E0DB-00DD-1E4B-E04F-DB99FFA20107}"/>
+              </a:ext>
+            </a:extLst>
+          </p:cNvPr>
+          <p:cNvPicPr>
+            <a:picLocks noChangeAspect="1"/>
+          </p:cNvPicPr>
+          <p:nvPr/>
+        </p:nvPicPr>
+        <p:blipFill>
+          <a:blip r:embed="rId2"/>
+          <a:srcRect l="10025" t="3163" r="12995" b="3163"/>
+          <a:stretch/>
+        </p:blipFill>
+        <p:spPr>
+          <a:xfrm>
+            <a:off x="3201786" y="1319815"/>
+            <a:ext cx="5992963" cy="5135109"/>
+          </a:xfrm>
+          <a:prstGeom prst="rect">
+            <a:avLst/>
+          </a:prstGeom>
+        </p:spPr>
+      </p:pic>
+      <p:sp>
+        <p:nvSpPr>
+          <p:cNvPr id="3" name="Tekstvak 2">
+            <a:extLst>
+              <a:ext uri="{FF2B5EF4-FFF2-40B4-BE49-F238E27FC236}">
+                <a16:creationId xmlns:a16="http://schemas.microsoft.com/office/drawing/2014/main" id="{207ECF3A-61ED-7AF4-F966-6C82D00D5879}"/>
+              </a:ext>
+            </a:extLst>
+          </p:cNvPr>
+          <p:cNvSpPr txBox="1"/>
+          <p:nvPr/>
+        </p:nvSpPr>
+        <p:spPr>
+          <a:xfrm>
+            <a:off x="684174" y="2963567"/>
+            <a:ext cx="2265123" cy="923330"/>
+          </a:xfrm>
+          <a:prstGeom prst="rect">
+            <a:avLst/>
+          </a:prstGeom>
+          <a:noFill/>
+        </p:spPr>
+        <p:txBody>
+          <a:bodyPr rot="0" spcFirstLastPara="0" vertOverflow="overflow" horzOverflow="overflow" vert="horz" wrap="square" lIns="91440" tIns="45720" rIns="91440" bIns="45720" numCol="1" spcCol="0" rtlCol="0" fromWordArt="0" anchor="t" anchorCtr="0" forceAA="0" compatLnSpc="1">
+            <a:prstTxWarp prst="textNoShape">
+              <a:avLst/>
+            </a:prstTxWarp>
+            <a:spAutoFit/>
+          </a:bodyPr>
+          <a:lstStyle/>
+          <a:p>
+            <a:r>
+              <a:rPr lang="nl-NL" dirty="0">
+                <a:ea typeface="Calibri"/>
+                <a:cs typeface="Calibri"/>
+              </a:rPr>
+              <a:t>By :</a:t>
+            </a:r>
+          </a:p>
+          <a:p>
+            <a:r>
+              <a:rPr lang="nl-NL" dirty="0">
+                <a:ea typeface="Calibri"/>
+                <a:cs typeface="Calibri"/>
+              </a:rPr>
+              <a:t>Sam De Wispelaere</a:t>
+            </a:r>
+          </a:p>
+          <a:p>
+            <a:r>
+              <a:rPr lang="nl-NL" dirty="0">
+                <a:ea typeface="Calibri"/>
+                <a:cs typeface="Calibri"/>
+              </a:rPr>
+              <a:t>Joren Vandewalle</a:t>
+            </a:r>
           </a:p>
         </p:txBody>
       </p:sp>
@@ -3401,6 +4202,1035 @@
     <p:extLst>
       <p:ext uri="{BB962C8B-B14F-4D97-AF65-F5344CB8AC3E}">
         <p14:creationId xmlns:p14="http://schemas.microsoft.com/office/powerpoint/2010/main" val="1383005855"/>
+      </p:ext>
+    </p:extLst>
+  </p:cSld>
+  <p:clrMapOvr>
+    <a:masterClrMapping/>
+  </p:clrMapOvr>
+</p:sld>
+</file>
+
+<file path=ppt/slides/slide2.xml><?xml version="1.0" encoding="utf-8"?>
+<p:sld xmlns:a="http://schemas.openxmlformats.org/drawingml/2006/main" xmlns:r="http://schemas.openxmlformats.org/officeDocument/2006/relationships" xmlns:p="http://schemas.openxmlformats.org/presentationml/2006/main">
+  <p:cSld>
+    <p:spTree>
+      <p:nvGrpSpPr>
+        <p:cNvPr id="1" name=""/>
+        <p:cNvGrpSpPr/>
+        <p:nvPr/>
+      </p:nvGrpSpPr>
+      <p:grpSpPr>
+        <a:xfrm>
+          <a:off x="0" y="0"/>
+          <a:ext cx="0" cy="0"/>
+          <a:chOff x="0" y="0"/>
+          <a:chExt cx="0" cy="0"/>
+        </a:xfrm>
+      </p:grpSpPr>
+      <p:sp>
+        <p:nvSpPr>
+          <p:cNvPr id="4" name="Tekstvak 3">
+            <a:extLst>
+              <a:ext uri="{FF2B5EF4-FFF2-40B4-BE49-F238E27FC236}">
+                <a16:creationId xmlns:a16="http://schemas.microsoft.com/office/drawing/2014/main" id="{A889BA1A-64DE-A483-2A92-833D7F6DD75E}"/>
+              </a:ext>
+            </a:extLst>
+          </p:cNvPr>
+          <p:cNvSpPr txBox="1"/>
+          <p:nvPr/>
+        </p:nvSpPr>
+        <p:spPr>
+          <a:xfrm>
+            <a:off x="0" y="-20877"/>
+            <a:ext cx="12192000" cy="707886"/>
+          </a:xfrm>
+          <a:prstGeom prst="rect">
+            <a:avLst/>
+          </a:prstGeom>
+          <a:noFill/>
+        </p:spPr>
+        <p:txBody>
+          <a:bodyPr rot="0" spcFirstLastPara="0" vertOverflow="overflow" horzOverflow="overflow" vert="horz" wrap="square" lIns="91440" tIns="45720" rIns="91440" bIns="45720" numCol="1" spcCol="0" rtlCol="0" fromWordArt="0" anchor="t" anchorCtr="0" forceAA="0" compatLnSpc="1">
+            <a:prstTxWarp prst="textNoShape">
+              <a:avLst/>
+            </a:prstTxWarp>
+            <a:spAutoFit/>
+          </a:bodyPr>
+          <a:lstStyle/>
+          <a:p>
+            <a:pPr algn="ctr"/>
+            <a:r>
+              <a:rPr lang="nl-NL" sz="4000" b="1" dirty="0">
+                <a:ea typeface="Calibri"/>
+                <a:cs typeface="Calibri"/>
+              </a:rPr>
+              <a:t>Doelstelling</a:t>
+            </a:r>
+          </a:p>
+        </p:txBody>
+      </p:sp>
+      <p:sp>
+        <p:nvSpPr>
+          <p:cNvPr id="6" name="Tekstvak 5">
+            <a:extLst>
+              <a:ext uri="{FF2B5EF4-FFF2-40B4-BE49-F238E27FC236}">
+                <a16:creationId xmlns:a16="http://schemas.microsoft.com/office/drawing/2014/main" id="{901EDD76-B13E-F571-DD21-2771F2627802}"/>
+              </a:ext>
+            </a:extLst>
+          </p:cNvPr>
+          <p:cNvSpPr txBox="1"/>
+          <p:nvPr/>
+        </p:nvSpPr>
+        <p:spPr>
+          <a:xfrm>
+            <a:off x="835068" y="1179534"/>
+            <a:ext cx="4070958" cy="400110"/>
+          </a:xfrm>
+          <a:prstGeom prst="rect">
+            <a:avLst/>
+          </a:prstGeom>
+          <a:noFill/>
+        </p:spPr>
+        <p:txBody>
+          <a:bodyPr rot="0" spcFirstLastPara="0" vertOverflow="overflow" horzOverflow="overflow" vert="horz" wrap="square" lIns="91440" tIns="45720" rIns="91440" bIns="45720" numCol="1" spcCol="0" rtlCol="0" fromWordArt="0" anchor="t" anchorCtr="0" forceAA="0" compatLnSpc="1">
+            <a:prstTxWarp prst="textNoShape">
+              <a:avLst/>
+            </a:prstTxWarp>
+            <a:spAutoFit/>
+          </a:bodyPr>
+          <a:lstStyle/>
+          <a:p>
+            <a:r>
+              <a:rPr lang="nl-NL" sz="2000" b="1" dirty="0">
+                <a:ea typeface="Calibri"/>
+                <a:cs typeface="Calibri"/>
+              </a:rPr>
+              <a:t>Hooftdoelstellingen :</a:t>
+            </a:r>
+            <a:endParaRPr lang="nl-NL" sz="2000" b="1" dirty="0"/>
+          </a:p>
+        </p:txBody>
+      </p:sp>
+      <p:sp>
+        <p:nvSpPr>
+          <p:cNvPr id="7" name="Tekstvak 6">
+            <a:extLst>
+              <a:ext uri="{FF2B5EF4-FFF2-40B4-BE49-F238E27FC236}">
+                <a16:creationId xmlns:a16="http://schemas.microsoft.com/office/drawing/2014/main" id="{5E0EB798-7206-64F8-2E54-C180D414F540}"/>
+              </a:ext>
+            </a:extLst>
+          </p:cNvPr>
+          <p:cNvSpPr txBox="1"/>
+          <p:nvPr/>
+        </p:nvSpPr>
+        <p:spPr>
+          <a:xfrm>
+            <a:off x="835067" y="3726492"/>
+            <a:ext cx="4070958" cy="400110"/>
+          </a:xfrm>
+          <a:prstGeom prst="rect">
+            <a:avLst/>
+          </a:prstGeom>
+          <a:noFill/>
+        </p:spPr>
+        <p:txBody>
+          <a:bodyPr rot="0" spcFirstLastPara="0" vertOverflow="overflow" horzOverflow="overflow" vert="horz" wrap="square" lIns="91440" tIns="45720" rIns="91440" bIns="45720" numCol="1" spcCol="0" rtlCol="0" fromWordArt="0" anchor="t" anchorCtr="0" forceAA="0" compatLnSpc="1">
+            <a:prstTxWarp prst="textNoShape">
+              <a:avLst/>
+            </a:prstTxWarp>
+            <a:spAutoFit/>
+          </a:bodyPr>
+          <a:lstStyle/>
+          <a:p>
+            <a:r>
+              <a:rPr lang="nl-NL" sz="2000" b="1" dirty="0">
+                <a:ea typeface="Calibri"/>
+                <a:cs typeface="Calibri"/>
+              </a:rPr>
+              <a:t>Subdoelstellingen :</a:t>
+            </a:r>
+            <a:endParaRPr lang="nl-NL" sz="2000" b="1" dirty="0"/>
+          </a:p>
+        </p:txBody>
+      </p:sp>
+      <p:sp>
+        <p:nvSpPr>
+          <p:cNvPr id="9" name="Tekstvak 8">
+            <a:extLst>
+              <a:ext uri="{FF2B5EF4-FFF2-40B4-BE49-F238E27FC236}">
+                <a16:creationId xmlns:a16="http://schemas.microsoft.com/office/drawing/2014/main" id="{FDE4E7C7-3505-81BD-1DE2-9A94A9155FD4}"/>
+              </a:ext>
+            </a:extLst>
+          </p:cNvPr>
+          <p:cNvSpPr txBox="1"/>
+          <p:nvPr/>
+        </p:nvSpPr>
+        <p:spPr>
+          <a:xfrm>
+            <a:off x="1127343" y="1544876"/>
+            <a:ext cx="3121068" cy="1200329"/>
+          </a:xfrm>
+          <a:prstGeom prst="rect">
+            <a:avLst/>
+          </a:prstGeom>
+          <a:noFill/>
+        </p:spPr>
+        <p:txBody>
+          <a:bodyPr rot="0" spcFirstLastPara="0" vertOverflow="overflow" horzOverflow="overflow" vert="horz" wrap="square" lIns="91440" tIns="45720" rIns="91440" bIns="45720" numCol="1" spcCol="0" rtlCol="0" fromWordArt="0" anchor="t" anchorCtr="0" forceAA="0" compatLnSpc="1">
+            <a:prstTxWarp prst="textNoShape">
+              <a:avLst/>
+            </a:prstTxWarp>
+            <a:spAutoFit/>
+          </a:bodyPr>
+          <a:lstStyle/>
+          <a:p>
+            <a:pPr marL="285750" indent="-285750">
+              <a:buFont typeface="Calibri"/>
+              <a:buChar char="-"/>
+            </a:pPr>
+            <a:r>
+              <a:rPr lang="nl-NL" dirty="0">
+                <a:ea typeface="Calibri"/>
+                <a:cs typeface="Calibri"/>
+              </a:rPr>
+              <a:t>Maak game</a:t>
+            </a:r>
+          </a:p>
+          <a:p>
+            <a:pPr marL="285750" indent="-285750">
+              <a:buFont typeface="Calibri"/>
+              <a:buChar char="-"/>
+            </a:pPr>
+            <a:r>
+              <a:rPr lang="nl-NL" dirty="0">
+                <a:ea typeface="Calibri"/>
+                <a:cs typeface="Calibri"/>
+              </a:rPr>
+              <a:t>Algoritme Cat</a:t>
+            </a:r>
+          </a:p>
+          <a:p>
+            <a:pPr marL="285750" indent="-285750">
+              <a:buFont typeface="Calibri"/>
+              <a:buChar char="-"/>
+            </a:pPr>
+            <a:r>
+              <a:rPr lang="nl-NL" dirty="0">
+                <a:ea typeface="Calibri"/>
+                <a:cs typeface="Calibri"/>
+              </a:rPr>
+              <a:t>Catch </a:t>
+            </a:r>
+            <a:r>
+              <a:rPr lang="nl-NL" dirty="0" err="1">
+                <a:ea typeface="Calibri"/>
+                <a:cs typeface="Calibri"/>
+              </a:rPr>
+              <a:t>the</a:t>
+            </a:r>
+            <a:r>
+              <a:rPr lang="nl-NL" dirty="0">
+                <a:ea typeface="Calibri"/>
+                <a:cs typeface="Calibri"/>
+              </a:rPr>
+              <a:t> Cat ( ML )</a:t>
+            </a:r>
+          </a:p>
+          <a:p>
+            <a:pPr marL="285750" indent="-285750">
+              <a:buFont typeface="Calibri"/>
+              <a:buChar char="-"/>
+            </a:pPr>
+            <a:endParaRPr lang="nl-NL" dirty="0">
+              <a:ea typeface="Calibri"/>
+              <a:cs typeface="Calibri"/>
+            </a:endParaRPr>
+          </a:p>
+        </p:txBody>
+      </p:sp>
+      <p:sp>
+        <p:nvSpPr>
+          <p:cNvPr id="11" name="Tekstvak 10">
+            <a:extLst>
+              <a:ext uri="{FF2B5EF4-FFF2-40B4-BE49-F238E27FC236}">
+                <a16:creationId xmlns:a16="http://schemas.microsoft.com/office/drawing/2014/main" id="{0DD6E799-E6EE-0D04-4D08-C15707FAB966}"/>
+              </a:ext>
+            </a:extLst>
+          </p:cNvPr>
+          <p:cNvSpPr txBox="1"/>
+          <p:nvPr/>
+        </p:nvSpPr>
+        <p:spPr>
+          <a:xfrm>
+            <a:off x="1127342" y="4123149"/>
+            <a:ext cx="3121068" cy="1200329"/>
+          </a:xfrm>
+          <a:prstGeom prst="rect">
+            <a:avLst/>
+          </a:prstGeom>
+          <a:noFill/>
+        </p:spPr>
+        <p:txBody>
+          <a:bodyPr rot="0" spcFirstLastPara="0" vertOverflow="overflow" horzOverflow="overflow" vert="horz" wrap="square" lIns="91440" tIns="45720" rIns="91440" bIns="45720" numCol="1" spcCol="0" rtlCol="0" fromWordArt="0" anchor="t" anchorCtr="0" forceAA="0" compatLnSpc="1">
+            <a:prstTxWarp prst="textNoShape">
+              <a:avLst/>
+            </a:prstTxWarp>
+            <a:spAutoFit/>
+          </a:bodyPr>
+          <a:lstStyle/>
+          <a:p>
+            <a:pPr marL="285750" indent="-285750">
+              <a:buFont typeface="Calibri"/>
+              <a:buChar char="-"/>
+            </a:pPr>
+            <a:r>
+              <a:rPr lang="nl-NL" dirty="0">
+                <a:ea typeface="Calibri"/>
+                <a:cs typeface="Calibri"/>
+              </a:rPr>
+              <a:t>Veld aanpassingen</a:t>
+            </a:r>
+          </a:p>
+          <a:p>
+            <a:pPr marL="285750" indent="-285750">
+              <a:buFont typeface="Calibri"/>
+              <a:buChar char="-"/>
+            </a:pPr>
+            <a:r>
+              <a:rPr lang="nl-NL" dirty="0">
+                <a:ea typeface="Calibri"/>
+                <a:cs typeface="Calibri"/>
+              </a:rPr>
+              <a:t>Catch </a:t>
+            </a:r>
+            <a:r>
+              <a:rPr lang="nl-NL" dirty="0" err="1">
+                <a:ea typeface="Calibri"/>
+                <a:cs typeface="Calibri"/>
+              </a:rPr>
+              <a:t>the</a:t>
+            </a:r>
+            <a:r>
+              <a:rPr lang="nl-NL" dirty="0">
+                <a:ea typeface="Calibri"/>
+                <a:cs typeface="Calibri"/>
+              </a:rPr>
+              <a:t> Cat ( Algoritme )</a:t>
+            </a:r>
+          </a:p>
+          <a:p>
+            <a:pPr marL="285750" indent="-285750">
+              <a:buFont typeface="Calibri"/>
+              <a:buChar char="-"/>
+            </a:pPr>
+            <a:r>
+              <a:rPr lang="nl-NL" dirty="0">
+                <a:ea typeface="Calibri"/>
+                <a:cs typeface="Calibri"/>
+              </a:rPr>
+              <a:t>Visueel weergeven</a:t>
+            </a:r>
+          </a:p>
+          <a:p>
+            <a:pPr marL="285750" indent="-285750">
+              <a:buFont typeface="Calibri"/>
+              <a:buChar char="-"/>
+            </a:pPr>
+            <a:endParaRPr lang="nl-NL" dirty="0">
+              <a:ea typeface="Calibri"/>
+              <a:cs typeface="Calibri"/>
+            </a:endParaRPr>
+          </a:p>
+        </p:txBody>
+      </p:sp>
+    </p:spTree>
+    <p:extLst>
+      <p:ext uri="{BB962C8B-B14F-4D97-AF65-F5344CB8AC3E}">
+        <p14:creationId xmlns:p14="http://schemas.microsoft.com/office/powerpoint/2010/main" val="2488136383"/>
+      </p:ext>
+    </p:extLst>
+  </p:cSld>
+  <p:clrMapOvr>
+    <a:masterClrMapping/>
+  </p:clrMapOvr>
+</p:sld>
+</file>
+
+<file path=ppt/slides/slide3.xml><?xml version="1.0" encoding="utf-8"?>
+<p:sld xmlns:a="http://schemas.openxmlformats.org/drawingml/2006/main" xmlns:r="http://schemas.openxmlformats.org/officeDocument/2006/relationships" xmlns:p="http://schemas.openxmlformats.org/presentationml/2006/main">
+  <p:cSld>
+    <p:spTree>
+      <p:nvGrpSpPr>
+        <p:cNvPr id="1" name=""/>
+        <p:cNvGrpSpPr/>
+        <p:nvPr/>
+      </p:nvGrpSpPr>
+      <p:grpSpPr>
+        <a:xfrm>
+          <a:off x="0" y="0"/>
+          <a:ext cx="0" cy="0"/>
+          <a:chOff x="0" y="0"/>
+          <a:chExt cx="0" cy="0"/>
+        </a:xfrm>
+      </p:grpSpPr>
+      <p:sp>
+        <p:nvSpPr>
+          <p:cNvPr id="4" name="Tekstvak 3">
+            <a:extLst>
+              <a:ext uri="{FF2B5EF4-FFF2-40B4-BE49-F238E27FC236}">
+                <a16:creationId xmlns:a16="http://schemas.microsoft.com/office/drawing/2014/main" id="{4D92B606-6B42-C684-0FA0-2DD926A8E319}"/>
+              </a:ext>
+            </a:extLst>
+          </p:cNvPr>
+          <p:cNvSpPr txBox="1"/>
+          <p:nvPr/>
+        </p:nvSpPr>
+        <p:spPr>
+          <a:xfrm>
+            <a:off x="0" y="10438"/>
+            <a:ext cx="12160684" cy="646331"/>
+          </a:xfrm>
+          <a:prstGeom prst="rect">
+            <a:avLst/>
+          </a:prstGeom>
+          <a:noFill/>
+        </p:spPr>
+        <p:txBody>
+          <a:bodyPr rot="0" spcFirstLastPara="0" vertOverflow="overflow" horzOverflow="overflow" vert="horz" wrap="square" lIns="91440" tIns="45720" rIns="91440" bIns="45720" numCol="1" spcCol="0" rtlCol="0" fromWordArt="0" anchor="t" anchorCtr="0" forceAA="0" compatLnSpc="1">
+            <a:prstTxWarp prst="textNoShape">
+              <a:avLst/>
+            </a:prstTxWarp>
+            <a:spAutoFit/>
+          </a:bodyPr>
+          <a:lstStyle/>
+          <a:p>
+            <a:pPr algn="ctr"/>
+            <a:r>
+              <a:rPr lang="nl-NL" sz="3600" b="1" dirty="0">
+                <a:ea typeface="Calibri"/>
+                <a:cs typeface="Calibri"/>
+              </a:rPr>
+              <a:t>The </a:t>
+            </a:r>
+            <a:r>
+              <a:rPr lang="nl-NL" sz="3600" b="1" err="1">
+                <a:ea typeface="Calibri"/>
+                <a:cs typeface="Calibri"/>
+              </a:rPr>
+              <a:t>cat</a:t>
+            </a:r>
+            <a:endParaRPr lang="nl-NL" sz="3600" dirty="0">
+              <a:ea typeface="Calibri"/>
+              <a:cs typeface="Calibri"/>
+            </a:endParaRPr>
+          </a:p>
+        </p:txBody>
+      </p:sp>
+      <p:pic>
+        <p:nvPicPr>
+          <p:cNvPr id="5" name="Afbeelding 4" descr="Afbeelding met tekst, schermopname, diagram, patroon&#10;&#10;Door AI gegenereerde inhoud is mogelijk onjuist.">
+            <a:extLst>
+              <a:ext uri="{FF2B5EF4-FFF2-40B4-BE49-F238E27FC236}">
+                <a16:creationId xmlns:a16="http://schemas.microsoft.com/office/drawing/2014/main" id="{BC9EC517-9906-71F8-EEB7-76FCA8C3C492}"/>
+              </a:ext>
+            </a:extLst>
+          </p:cNvPr>
+          <p:cNvPicPr>
+            <a:picLocks noChangeAspect="1"/>
+          </p:cNvPicPr>
+          <p:nvPr/>
+        </p:nvPicPr>
+        <p:blipFill>
+          <a:blip r:embed="rId2"/>
+          <a:srcRect l="26509" t="8938" r="394" b="337"/>
+          <a:stretch/>
+        </p:blipFill>
+        <p:spPr>
+          <a:xfrm>
+            <a:off x="5729583" y="751560"/>
+            <a:ext cx="5812689" cy="5615855"/>
+          </a:xfrm>
+          <a:prstGeom prst="rect">
+            <a:avLst/>
+          </a:prstGeom>
+        </p:spPr>
+      </p:pic>
+      <p:sp>
+        <p:nvSpPr>
+          <p:cNvPr id="6" name="Tekstvak 5">
+            <a:extLst>
+              <a:ext uri="{FF2B5EF4-FFF2-40B4-BE49-F238E27FC236}">
+                <a16:creationId xmlns:a16="http://schemas.microsoft.com/office/drawing/2014/main" id="{19FEA7B4-26CE-803F-D412-4654AA90A7B1}"/>
+              </a:ext>
+            </a:extLst>
+          </p:cNvPr>
+          <p:cNvSpPr txBox="1"/>
+          <p:nvPr/>
+        </p:nvSpPr>
+        <p:spPr>
+          <a:xfrm>
+            <a:off x="521918" y="960329"/>
+            <a:ext cx="3956136" cy="369332"/>
+          </a:xfrm>
+          <a:prstGeom prst="rect">
+            <a:avLst/>
+          </a:prstGeom>
+          <a:noFill/>
+        </p:spPr>
+        <p:txBody>
+          <a:bodyPr rot="0" spcFirstLastPara="0" vertOverflow="overflow" horzOverflow="overflow" vert="horz" wrap="square" lIns="91440" tIns="45720" rIns="91440" bIns="45720" numCol="1" spcCol="0" rtlCol="0" fromWordArt="0" anchor="t" anchorCtr="0" forceAA="0" compatLnSpc="1">
+            <a:prstTxWarp prst="textNoShape">
+              <a:avLst/>
+            </a:prstTxWarp>
+            <a:spAutoFit/>
+          </a:bodyPr>
+          <a:lstStyle/>
+          <a:p>
+            <a:r>
+              <a:rPr lang="nl-NL" b="1" dirty="0">
+                <a:ea typeface="Calibri" panose="020F0502020204030204"/>
+                <a:cs typeface="Calibri" panose="020F0502020204030204"/>
+              </a:rPr>
+              <a:t>Doel :</a:t>
+            </a:r>
+            <a:endParaRPr lang="nl-NL" b="1" dirty="0"/>
+          </a:p>
+        </p:txBody>
+      </p:sp>
+      <p:sp>
+        <p:nvSpPr>
+          <p:cNvPr id="9" name="Tekstvak 8">
+            <a:extLst>
+              <a:ext uri="{FF2B5EF4-FFF2-40B4-BE49-F238E27FC236}">
+                <a16:creationId xmlns:a16="http://schemas.microsoft.com/office/drawing/2014/main" id="{E17009D8-F027-A8B8-CE46-C40B7C64608D}"/>
+              </a:ext>
+            </a:extLst>
+          </p:cNvPr>
+          <p:cNvSpPr txBox="1"/>
+          <p:nvPr/>
+        </p:nvSpPr>
+        <p:spPr>
+          <a:xfrm>
+            <a:off x="814192" y="1325670"/>
+            <a:ext cx="3121068" cy="1200329"/>
+          </a:xfrm>
+          <a:prstGeom prst="rect">
+            <a:avLst/>
+          </a:prstGeom>
+          <a:noFill/>
+        </p:spPr>
+        <p:txBody>
+          <a:bodyPr rot="0" spcFirstLastPara="0" vertOverflow="overflow" horzOverflow="overflow" vert="horz" wrap="square" lIns="91440" tIns="45720" rIns="91440" bIns="45720" numCol="1" spcCol="0" rtlCol="0" fromWordArt="0" anchor="t" anchorCtr="0" forceAA="0" compatLnSpc="1">
+            <a:prstTxWarp prst="textNoShape">
+              <a:avLst/>
+            </a:prstTxWarp>
+            <a:spAutoFit/>
+          </a:bodyPr>
+          <a:lstStyle/>
+          <a:p>
+            <a:pPr marL="285750" indent="-285750">
+              <a:buFont typeface="Calibri"/>
+              <a:buChar char="-"/>
+            </a:pPr>
+            <a:r>
+              <a:rPr lang="nl-NL" dirty="0">
+                <a:ea typeface="Calibri"/>
+                <a:cs typeface="Calibri"/>
+              </a:rPr>
+              <a:t>Ontsnap</a:t>
+            </a:r>
+          </a:p>
+          <a:p>
+            <a:pPr marL="285750" indent="-285750">
+              <a:buFont typeface="Calibri"/>
+              <a:buChar char="-"/>
+            </a:pPr>
+            <a:r>
+              <a:rPr lang="nl-NL" dirty="0" err="1">
+                <a:ea typeface="Calibri"/>
+                <a:cs typeface="Calibri"/>
+              </a:rPr>
+              <a:t>Hex</a:t>
+            </a:r>
+            <a:r>
+              <a:rPr lang="nl-NL" dirty="0">
+                <a:ea typeface="Calibri"/>
+                <a:cs typeface="Calibri"/>
+              </a:rPr>
+              <a:t> Veld</a:t>
+            </a:r>
+          </a:p>
+          <a:p>
+            <a:pPr marL="285750" indent="-285750">
+              <a:buFont typeface="Calibri"/>
+              <a:buChar char="-"/>
+            </a:pPr>
+            <a:r>
+              <a:rPr lang="nl-NL" dirty="0">
+                <a:ea typeface="Calibri"/>
+                <a:cs typeface="Calibri"/>
+              </a:rPr>
+              <a:t>Aanliggende vakken</a:t>
+            </a:r>
+          </a:p>
+          <a:p>
+            <a:pPr marL="285750" indent="-285750">
+              <a:buFont typeface="Calibri"/>
+              <a:buChar char="-"/>
+            </a:pPr>
+            <a:endParaRPr lang="nl-NL" dirty="0">
+              <a:ea typeface="Calibri"/>
+              <a:cs typeface="Calibri"/>
+            </a:endParaRPr>
+          </a:p>
+        </p:txBody>
+      </p:sp>
+      <p:sp>
+        <p:nvSpPr>
+          <p:cNvPr id="10" name="Tekstvak 9">
+            <a:extLst>
+              <a:ext uri="{FF2B5EF4-FFF2-40B4-BE49-F238E27FC236}">
+                <a16:creationId xmlns:a16="http://schemas.microsoft.com/office/drawing/2014/main" id="{A52EFED8-AE28-C87E-3EE2-1606E9B95768}"/>
+              </a:ext>
+            </a:extLst>
+          </p:cNvPr>
+          <p:cNvSpPr txBox="1"/>
+          <p:nvPr/>
+        </p:nvSpPr>
+        <p:spPr>
+          <a:xfrm>
+            <a:off x="525273" y="2761814"/>
+            <a:ext cx="2657928" cy="369332"/>
+          </a:xfrm>
+          <a:prstGeom prst="rect">
+            <a:avLst/>
+          </a:prstGeom>
+          <a:noFill/>
+        </p:spPr>
+        <p:txBody>
+          <a:bodyPr rot="0" spcFirstLastPara="0" vertOverflow="overflow" horzOverflow="overflow" vert="horz" wrap="square" lIns="91440" tIns="45720" rIns="91440" bIns="45720" numCol="1" spcCol="0" rtlCol="0" fromWordArt="0" anchor="t" anchorCtr="0" forceAA="0" compatLnSpc="1">
+            <a:prstTxWarp prst="textNoShape">
+              <a:avLst/>
+            </a:prstTxWarp>
+            <a:spAutoFit/>
+          </a:bodyPr>
+          <a:lstStyle/>
+          <a:p>
+            <a:r>
+              <a:rPr lang="nl-NL" b="1" dirty="0">
+                <a:ea typeface="Calibri"/>
+                <a:cs typeface="Calibri"/>
+              </a:rPr>
+              <a:t>A* :</a:t>
+            </a:r>
+          </a:p>
+        </p:txBody>
+      </p:sp>
+      <p:sp>
+        <p:nvSpPr>
+          <p:cNvPr id="12" name="Tekstvak 11">
+            <a:extLst>
+              <a:ext uri="{FF2B5EF4-FFF2-40B4-BE49-F238E27FC236}">
+                <a16:creationId xmlns:a16="http://schemas.microsoft.com/office/drawing/2014/main" id="{6FC933E9-EC58-E0DB-BA31-0BB5349E54C0}"/>
+              </a:ext>
+            </a:extLst>
+          </p:cNvPr>
+          <p:cNvSpPr txBox="1"/>
+          <p:nvPr/>
+        </p:nvSpPr>
+        <p:spPr>
+          <a:xfrm>
+            <a:off x="814192" y="3131506"/>
+            <a:ext cx="3121068" cy="1200329"/>
+          </a:xfrm>
+          <a:prstGeom prst="rect">
+            <a:avLst/>
+          </a:prstGeom>
+          <a:noFill/>
+        </p:spPr>
+        <p:txBody>
+          <a:bodyPr rot="0" spcFirstLastPara="0" vertOverflow="overflow" horzOverflow="overflow" vert="horz" wrap="square" lIns="91440" tIns="45720" rIns="91440" bIns="45720" numCol="1" spcCol="0" rtlCol="0" fromWordArt="0" anchor="t" anchorCtr="0" forceAA="0" compatLnSpc="1">
+            <a:prstTxWarp prst="textNoShape">
+              <a:avLst/>
+            </a:prstTxWarp>
+            <a:spAutoFit/>
+          </a:bodyPr>
+          <a:lstStyle/>
+          <a:p>
+            <a:pPr marL="285750" indent="-285750">
+              <a:buFont typeface="Calibri"/>
+              <a:buChar char="-"/>
+            </a:pPr>
+            <a:r>
+              <a:rPr lang="nl-NL" dirty="0">
+                <a:ea typeface="Calibri"/>
+                <a:cs typeface="Calibri"/>
+              </a:rPr>
+              <a:t>Kortste weg</a:t>
+            </a:r>
+          </a:p>
+          <a:p>
+            <a:pPr marL="285750" indent="-285750">
+              <a:buFont typeface="Calibri"/>
+              <a:buChar char="-"/>
+            </a:pPr>
+            <a:r>
+              <a:rPr lang="nl-NL" dirty="0">
+                <a:ea typeface="Calibri"/>
+                <a:cs typeface="Calibri"/>
+              </a:rPr>
+              <a:t>Algoritme Cat</a:t>
+            </a:r>
+          </a:p>
+          <a:p>
+            <a:pPr marL="285750" indent="-285750">
+              <a:buFont typeface="Calibri"/>
+              <a:buChar char="-"/>
+            </a:pPr>
+            <a:r>
+              <a:rPr lang="nl-NL" dirty="0">
+                <a:ea typeface="Calibri"/>
+                <a:cs typeface="Calibri"/>
+              </a:rPr>
+              <a:t>Catch </a:t>
+            </a:r>
+            <a:r>
+              <a:rPr lang="nl-NL" dirty="0" err="1">
+                <a:ea typeface="Calibri"/>
+                <a:cs typeface="Calibri"/>
+              </a:rPr>
+              <a:t>the</a:t>
+            </a:r>
+            <a:r>
+              <a:rPr lang="nl-NL" dirty="0">
+                <a:ea typeface="Calibri"/>
+                <a:cs typeface="Calibri"/>
+              </a:rPr>
+              <a:t> Cat ( ML )</a:t>
+            </a:r>
+          </a:p>
+          <a:p>
+            <a:pPr marL="285750" indent="-285750">
+              <a:buFont typeface="Calibri"/>
+              <a:buChar char="-"/>
+            </a:pPr>
+            <a:endParaRPr lang="nl-NL" dirty="0">
+              <a:ea typeface="Calibri"/>
+              <a:cs typeface="Calibri"/>
+            </a:endParaRPr>
+          </a:p>
+        </p:txBody>
+      </p:sp>
+      <p:sp>
+        <p:nvSpPr>
+          <p:cNvPr id="16" name="Tekstvak 15">
+            <a:extLst>
+              <a:ext uri="{FF2B5EF4-FFF2-40B4-BE49-F238E27FC236}">
+                <a16:creationId xmlns:a16="http://schemas.microsoft.com/office/drawing/2014/main" id="{8E2E697B-55A0-BB6D-BF46-3012F6A7F263}"/>
+              </a:ext>
+            </a:extLst>
+          </p:cNvPr>
+          <p:cNvSpPr txBox="1"/>
+          <p:nvPr/>
+        </p:nvSpPr>
+        <p:spPr>
+          <a:xfrm>
+            <a:off x="525272" y="4421512"/>
+            <a:ext cx="2657928" cy="369332"/>
+          </a:xfrm>
+          <a:prstGeom prst="rect">
+            <a:avLst/>
+          </a:prstGeom>
+          <a:noFill/>
+        </p:spPr>
+        <p:txBody>
+          <a:bodyPr rot="0" spcFirstLastPara="0" vertOverflow="overflow" horzOverflow="overflow" vert="horz" wrap="square" lIns="91440" tIns="45720" rIns="91440" bIns="45720" numCol="1" spcCol="0" rtlCol="0" fromWordArt="0" anchor="t" anchorCtr="0" forceAA="0" compatLnSpc="1">
+            <a:prstTxWarp prst="textNoShape">
+              <a:avLst/>
+            </a:prstTxWarp>
+            <a:spAutoFit/>
+          </a:bodyPr>
+          <a:lstStyle/>
+          <a:p>
+            <a:r>
+              <a:rPr lang="nl-NL" b="1" dirty="0">
+                <a:ea typeface="Calibri"/>
+                <a:cs typeface="Calibri"/>
+              </a:rPr>
+              <a:t>Ingesloten :</a:t>
+            </a:r>
+          </a:p>
+        </p:txBody>
+      </p:sp>
+      <p:sp>
+        <p:nvSpPr>
+          <p:cNvPr id="17" name="Tekstvak 16">
+            <a:extLst>
+              <a:ext uri="{FF2B5EF4-FFF2-40B4-BE49-F238E27FC236}">
+                <a16:creationId xmlns:a16="http://schemas.microsoft.com/office/drawing/2014/main" id="{24A7AFC7-700C-B5BB-694B-EBE5C2BA56EB}"/>
+              </a:ext>
+            </a:extLst>
+          </p:cNvPr>
+          <p:cNvSpPr txBox="1"/>
+          <p:nvPr/>
+        </p:nvSpPr>
+        <p:spPr>
+          <a:xfrm>
+            <a:off x="814191" y="4791205"/>
+            <a:ext cx="3121068" cy="646331"/>
+          </a:xfrm>
+          <a:prstGeom prst="rect">
+            <a:avLst/>
+          </a:prstGeom>
+          <a:noFill/>
+        </p:spPr>
+        <p:txBody>
+          <a:bodyPr rot="0" spcFirstLastPara="0" vertOverflow="overflow" horzOverflow="overflow" vert="horz" wrap="square" lIns="91440" tIns="45720" rIns="91440" bIns="45720" numCol="1" spcCol="0" rtlCol="0" fromWordArt="0" anchor="t" anchorCtr="0" forceAA="0" compatLnSpc="1">
+            <a:prstTxWarp prst="textNoShape">
+              <a:avLst/>
+            </a:prstTxWarp>
+            <a:spAutoFit/>
+          </a:bodyPr>
+          <a:lstStyle/>
+          <a:p>
+            <a:pPr marL="285750" indent="-285750">
+              <a:buFont typeface="Calibri"/>
+              <a:buChar char="-"/>
+            </a:pPr>
+            <a:r>
+              <a:rPr lang="nl-NL" dirty="0">
+                <a:ea typeface="Calibri"/>
+                <a:cs typeface="Calibri"/>
+              </a:rPr>
+              <a:t>Random Moves</a:t>
+            </a:r>
+            <a:endParaRPr lang="nl-NL" dirty="0"/>
+          </a:p>
+          <a:p>
+            <a:pPr marL="285750" indent="-285750">
+              <a:buFont typeface="Calibri"/>
+              <a:buChar char="-"/>
+            </a:pPr>
+            <a:endParaRPr lang="nl-NL" dirty="0">
+              <a:ea typeface="Calibri"/>
+              <a:cs typeface="Calibri"/>
+            </a:endParaRPr>
+          </a:p>
+        </p:txBody>
+      </p:sp>
+    </p:spTree>
+    <p:extLst>
+      <p:ext uri="{BB962C8B-B14F-4D97-AF65-F5344CB8AC3E}">
+        <p14:creationId xmlns:p14="http://schemas.microsoft.com/office/powerpoint/2010/main" val="2677107523"/>
+      </p:ext>
+    </p:extLst>
+  </p:cSld>
+  <p:clrMapOvr>
+    <a:masterClrMapping/>
+  </p:clrMapOvr>
+</p:sld>
+</file>
+
+<file path=ppt/slides/slide4.xml><?xml version="1.0" encoding="utf-8"?>
+<p:sld xmlns:a="http://schemas.openxmlformats.org/drawingml/2006/main" xmlns:r="http://schemas.openxmlformats.org/officeDocument/2006/relationships" xmlns:p="http://schemas.openxmlformats.org/presentationml/2006/main">
+  <p:cSld>
+    <p:spTree>
+      <p:nvGrpSpPr>
+        <p:cNvPr id="1" name=""/>
+        <p:cNvGrpSpPr/>
+        <p:nvPr/>
+      </p:nvGrpSpPr>
+      <p:grpSpPr>
+        <a:xfrm>
+          <a:off x="0" y="0"/>
+          <a:ext cx="0" cy="0"/>
+          <a:chOff x="0" y="0"/>
+          <a:chExt cx="0" cy="0"/>
+        </a:xfrm>
+      </p:grpSpPr>
+      <p:sp>
+        <p:nvSpPr>
+          <p:cNvPr id="4" name="Tekstvak 3">
+            <a:extLst>
+              <a:ext uri="{FF2B5EF4-FFF2-40B4-BE49-F238E27FC236}">
+                <a16:creationId xmlns:a16="http://schemas.microsoft.com/office/drawing/2014/main" id="{01EF5FD8-7DF9-B4F9-C9E1-C688A8ED99F4}"/>
+              </a:ext>
+            </a:extLst>
+          </p:cNvPr>
+          <p:cNvSpPr txBox="1"/>
+          <p:nvPr/>
+        </p:nvSpPr>
+        <p:spPr>
+          <a:xfrm>
+            <a:off x="0" y="0"/>
+            <a:ext cx="12155714" cy="584775"/>
+          </a:xfrm>
+          <a:prstGeom prst="rect">
+            <a:avLst/>
+          </a:prstGeom>
+          <a:noFill/>
+        </p:spPr>
+        <p:txBody>
+          <a:bodyPr rot="0" spcFirstLastPara="0" vertOverflow="overflow" horzOverflow="overflow" vert="horz" wrap="square" lIns="91440" tIns="45720" rIns="91440" bIns="45720" numCol="1" spcCol="0" rtlCol="0" fromWordArt="0" anchor="t" anchorCtr="0" forceAA="0" compatLnSpc="1">
+            <a:prstTxWarp prst="textNoShape">
+              <a:avLst/>
+            </a:prstTxWarp>
+            <a:spAutoFit/>
+          </a:bodyPr>
+          <a:lstStyle/>
+          <a:p>
+            <a:pPr algn="ctr"/>
+            <a:r>
+              <a:rPr lang="nl-NL" sz="3200" b="1" dirty="0">
+                <a:ea typeface="Calibri"/>
+                <a:cs typeface="Calibri"/>
+              </a:rPr>
+              <a:t>Machine learning</a:t>
+            </a:r>
+            <a:endParaRPr lang="nl-NL" sz="3200" b="1">
+              <a:ea typeface="Calibri"/>
+              <a:cs typeface="Calibri"/>
+            </a:endParaRPr>
+          </a:p>
+        </p:txBody>
+      </p:sp>
+      <p:sp>
+        <p:nvSpPr>
+          <p:cNvPr id="5" name="Tekstvak 4">
+            <a:extLst>
+              <a:ext uri="{FF2B5EF4-FFF2-40B4-BE49-F238E27FC236}">
+                <a16:creationId xmlns:a16="http://schemas.microsoft.com/office/drawing/2014/main" id="{1E5175BD-D8E7-F22E-0E75-3AB93BCFCED2}"/>
+              </a:ext>
+            </a:extLst>
+          </p:cNvPr>
+          <p:cNvSpPr txBox="1"/>
+          <p:nvPr/>
+        </p:nvSpPr>
+        <p:spPr>
+          <a:xfrm>
+            <a:off x="696289" y="1732947"/>
+            <a:ext cx="2946239" cy="369332"/>
+          </a:xfrm>
+          <a:prstGeom prst="rect">
+            <a:avLst/>
+          </a:prstGeom>
+          <a:noFill/>
+        </p:spPr>
+        <p:txBody>
+          <a:bodyPr rot="0" spcFirstLastPara="0" vertOverflow="overflow" horzOverflow="overflow" vert="horz" wrap="square" lIns="91440" tIns="45720" rIns="91440" bIns="45720" numCol="1" spcCol="0" rtlCol="0" fromWordArt="0" anchor="t" anchorCtr="0" forceAA="0" compatLnSpc="1">
+            <a:prstTxWarp prst="textNoShape">
+              <a:avLst/>
+            </a:prstTxWarp>
+            <a:spAutoFit/>
+          </a:bodyPr>
+          <a:lstStyle/>
+          <a:p>
+            <a:r>
+              <a:rPr lang="nl-NL" b="1" dirty="0">
+                <a:ea typeface="Calibri"/>
+                <a:cs typeface="Calibri"/>
+              </a:rPr>
+              <a:t>Moeilijkheid (RL) : </a:t>
+            </a:r>
+          </a:p>
+        </p:txBody>
+      </p:sp>
+      <p:sp>
+        <p:nvSpPr>
+          <p:cNvPr id="7" name="Tekstvak 6">
+            <a:extLst>
+              <a:ext uri="{FF2B5EF4-FFF2-40B4-BE49-F238E27FC236}">
+                <a16:creationId xmlns:a16="http://schemas.microsoft.com/office/drawing/2014/main" id="{9C96BE31-7572-8DE0-C7E0-553D48B1FA0F}"/>
+              </a:ext>
+            </a:extLst>
+          </p:cNvPr>
+          <p:cNvSpPr txBox="1"/>
+          <p:nvPr/>
+        </p:nvSpPr>
+        <p:spPr>
+          <a:xfrm>
+            <a:off x="1084268" y="2097315"/>
+            <a:ext cx="3121068" cy="1477328"/>
+          </a:xfrm>
+          <a:prstGeom prst="rect">
+            <a:avLst/>
+          </a:prstGeom>
+          <a:noFill/>
+        </p:spPr>
+        <p:txBody>
+          <a:bodyPr rot="0" spcFirstLastPara="0" vertOverflow="overflow" horzOverflow="overflow" vert="horz" wrap="square" lIns="91440" tIns="45720" rIns="91440" bIns="45720" numCol="1" spcCol="0" rtlCol="0" fromWordArt="0" anchor="t" anchorCtr="0" forceAA="0" compatLnSpc="1">
+            <a:prstTxWarp prst="textNoShape">
+              <a:avLst/>
+            </a:prstTxWarp>
+            <a:spAutoFit/>
+          </a:bodyPr>
+          <a:lstStyle/>
+          <a:p>
+            <a:pPr marL="285750" indent="-285750">
+              <a:buFont typeface="Calibri"/>
+              <a:buChar char="-"/>
+            </a:pPr>
+            <a:r>
+              <a:rPr lang="nl-NL" dirty="0">
+                <a:ea typeface="Calibri"/>
+                <a:cs typeface="Calibri"/>
+              </a:rPr>
+              <a:t>Aantal startvelden</a:t>
+            </a:r>
+          </a:p>
+          <a:p>
+            <a:pPr marL="285750" indent="-285750">
+              <a:buFont typeface="Calibri"/>
+              <a:buChar char="-"/>
+            </a:pPr>
+            <a:r>
+              <a:rPr lang="nl-NL" dirty="0">
+                <a:ea typeface="Calibri"/>
+                <a:cs typeface="Calibri"/>
+              </a:rPr>
+              <a:t>Delayed rewards</a:t>
+            </a:r>
+          </a:p>
+          <a:p>
+            <a:pPr marL="285750" indent="-285750">
+              <a:buFont typeface="Calibri"/>
+              <a:buChar char="-"/>
+            </a:pPr>
+            <a:r>
+              <a:rPr lang="nl-NL" dirty="0">
+                <a:ea typeface="Calibri"/>
+                <a:cs typeface="Calibri"/>
+              </a:rPr>
+              <a:t>Beloningsstructuur</a:t>
+            </a:r>
+          </a:p>
+          <a:p>
+            <a:pPr marL="285750" indent="-285750">
+              <a:buFont typeface="Calibri"/>
+              <a:buChar char="-"/>
+            </a:pPr>
+            <a:endParaRPr lang="nl-NL" dirty="0">
+              <a:ea typeface="Calibri"/>
+              <a:cs typeface="Calibri"/>
+            </a:endParaRPr>
+          </a:p>
+          <a:p>
+            <a:pPr marL="285750" indent="-285750">
+              <a:buFont typeface="Calibri"/>
+              <a:buChar char="-"/>
+            </a:pPr>
+            <a:endParaRPr lang="nl-NL" dirty="0">
+              <a:ea typeface="Calibri"/>
+              <a:cs typeface="Calibri"/>
+            </a:endParaRPr>
+          </a:p>
+        </p:txBody>
+      </p:sp>
+    </p:spTree>
+    <p:extLst>
+      <p:ext uri="{BB962C8B-B14F-4D97-AF65-F5344CB8AC3E}">
+        <p14:creationId xmlns:p14="http://schemas.microsoft.com/office/powerpoint/2010/main" val="1890171273"/>
       </p:ext>
     </p:extLst>
   </p:cSld>
@@ -3933,20 +5763,20 @@
 </file>
 
 <file path=customXml/item2.xml><?xml version="1.0" encoding="utf-8"?>
+<p:properties xmlns:p="http://schemas.microsoft.com/office/2006/metadata/properties" xmlns:xsi="http://www.w3.org/2001/XMLSchema-instance" xmlns:pc="http://schemas.microsoft.com/office/infopath/2007/PartnerControls">
+  <documentManagement>
+    <_activity xmlns="7f56e509-dbb5-472b-882b-e910fc7d143e" xsi:nil="true"/>
+  </documentManagement>
+</p:properties>
+</file>
+
+<file path=customXml/item3.xml><?xml version="1.0" encoding="utf-8"?>
 <?mso-contentType ?>
 <FormTemplates xmlns="http://schemas.microsoft.com/sharepoint/v3/contenttype/forms">
   <Display>DocumentLibraryForm</Display>
   <Edit>DocumentLibraryForm</Edit>
   <New>DocumentLibraryForm</New>
 </FormTemplates>
-</file>
-
-<file path=customXml/item3.xml><?xml version="1.0" encoding="utf-8"?>
-<p:properties xmlns:p="http://schemas.microsoft.com/office/2006/metadata/properties" xmlns:xsi="http://www.w3.org/2001/XMLSchema-instance" xmlns:pc="http://schemas.microsoft.com/office/infopath/2007/PartnerControls">
-  <documentManagement>
-    <_activity xmlns="7f56e509-dbb5-472b-882b-e910fc7d143e" xsi:nil="true"/>
-  </documentManagement>
-</p:properties>
 </file>
 
 <file path=customXml/itemProps1.xml><?xml version="1.0" encoding="utf-8"?>
@@ -3969,14 +5799,6 @@
 </file>
 
 <file path=customXml/itemProps2.xml><?xml version="1.0" encoding="utf-8"?>
-<ds:datastoreItem xmlns:ds="http://schemas.openxmlformats.org/officeDocument/2006/customXml" ds:itemID="{4F3443F0-6A5C-46A7-8E3D-D7E09EC9A70E}">
-  <ds:schemaRefs>
-    <ds:schemaRef ds:uri="http://schemas.microsoft.com/sharepoint/v3/contenttype/forms"/>
-  </ds:schemaRefs>
-</ds:datastoreItem>
-</file>
-
-<file path=customXml/itemProps3.xml><?xml version="1.0" encoding="utf-8"?>
 <ds:datastoreItem xmlns:ds="http://schemas.openxmlformats.org/officeDocument/2006/customXml" ds:itemID="{6234E3CF-4DF9-4EF3-93B4-230503F9C7E2}">
   <ds:schemaRefs>
     <ds:schemaRef ds:uri="http://schemas.microsoft.com/office/2006/metadata/properties"/>
@@ -3991,4 +5813,12 @@
     <ds:schemaRef ds:uri="http://purl.org/dc/terms/"/>
   </ds:schemaRefs>
 </ds:datastoreItem>
+</file>
+
+<file path=customXml/itemProps3.xml><?xml version="1.0" encoding="utf-8"?>
+<ds:datastoreItem xmlns:ds="http://schemas.openxmlformats.org/officeDocument/2006/customXml" ds:itemID="{4F3443F0-6A5C-46A7-8E3D-D7E09EC9A70E}">
+  <ds:schemaRefs>
+    <ds:schemaRef ds:uri="http://schemas.microsoft.com/sharepoint/v3/contenttype/forms"/>
+  </ds:schemaRefs>
+</ds:datastoreItem>
 </file>
</xml_diff>